<commit_message>
Added Final Presentation to Github
</commit_message>
<xml_diff>
--- a/Project_3_Proposal.pptx
+++ b/Project_3_Proposal.pptx
@@ -9,9 +9,15 @@
     <p:sldId id="257" r:id="rId3"/>
     <p:sldId id="258" r:id="rId4"/>
     <p:sldId id="260" r:id="rId5"/>
-    <p:sldId id="259" r:id="rId6"/>
+    <p:sldId id="263" r:id="rId6"/>
     <p:sldId id="261" r:id="rId7"/>
-    <p:sldId id="262" r:id="rId8"/>
+    <p:sldId id="264" r:id="rId8"/>
+    <p:sldId id="262" r:id="rId9"/>
+    <p:sldId id="265" r:id="rId10"/>
+    <p:sldId id="266" r:id="rId11"/>
+    <p:sldId id="267" r:id="rId12"/>
+    <p:sldId id="268" r:id="rId13"/>
+    <p:sldId id="269" r:id="rId14"/>
   </p:sldIdLst>
   <p:sldSz cx="12192000" cy="6858000"/>
   <p:notesSz cx="6858000" cy="9144000"/>
@@ -118,6 +124,971 @@
 </p:presentation>
 </file>
 
+<file path=ppt/charts/chart1.xml><?xml version="1.0" encoding="utf-8"?>
+<c:chartSpace xmlns:c="http://schemas.openxmlformats.org/drawingml/2006/chart" xmlns:a="http://schemas.openxmlformats.org/drawingml/2006/main" xmlns:r="http://schemas.openxmlformats.org/officeDocument/2006/relationships" xmlns:c16r2="http://schemas.microsoft.com/office/drawing/2015/06/chart">
+  <c:date1904 val="0"/>
+  <c:lang val="en-US"/>
+  <c:roundedCorners val="0"/>
+  <mc:AlternateContent xmlns:mc="http://schemas.openxmlformats.org/markup-compatibility/2006">
+    <mc:Choice xmlns:c14="http://schemas.microsoft.com/office/drawing/2007/8/2/chart" Requires="c14">
+      <c14:style val="102"/>
+    </mc:Choice>
+    <mc:Fallback>
+      <c:style val="2"/>
+    </mc:Fallback>
+  </mc:AlternateContent>
+  <c:chart>
+    <c:title>
+      <c:tx>
+        <c:rich>
+          <a:bodyPr rot="0" spcFirstLastPara="1" vertOverflow="ellipsis" vert="horz" wrap="square" anchor="ctr" anchorCtr="1"/>
+          <a:lstStyle/>
+          <a:p>
+            <a:pPr>
+              <a:defRPr sz="1400" b="0" i="0" u="none" strike="noStrike" kern="1200" spc="0" baseline="0">
+                <a:solidFill>
+                  <a:schemeClr val="tx1">
+                    <a:lumMod val="65000"/>
+                    <a:lumOff val="35000"/>
+                  </a:schemeClr>
+                </a:solidFill>
+                <a:latin typeface="+mn-lt"/>
+                <a:ea typeface="+mn-ea"/>
+                <a:cs typeface="+mn-cs"/>
+              </a:defRPr>
+            </a:pPr>
+            <a:r>
+              <a:rPr lang="en-US"/>
+              <a:t>Actual</a:t>
+            </a:r>
+            <a:r>
+              <a:rPr lang="en-US" baseline="0"/>
+              <a:t> Metacritic Scores vs Predicted Scores</a:t>
+            </a:r>
+            <a:endParaRPr lang="en-US"/>
+          </a:p>
+        </c:rich>
+      </c:tx>
+      <c:overlay val="0"/>
+      <c:spPr>
+        <a:noFill/>
+        <a:ln>
+          <a:noFill/>
+        </a:ln>
+        <a:effectLst/>
+      </c:spPr>
+      <c:txPr>
+        <a:bodyPr rot="0" spcFirstLastPara="1" vertOverflow="ellipsis" vert="horz" wrap="square" anchor="ctr" anchorCtr="1"/>
+        <a:lstStyle/>
+        <a:p>
+          <a:pPr>
+            <a:defRPr sz="1400" b="0" i="0" u="none" strike="noStrike" kern="1200" spc="0" baseline="0">
+              <a:solidFill>
+                <a:schemeClr val="tx1">
+                  <a:lumMod val="65000"/>
+                  <a:lumOff val="35000"/>
+                </a:schemeClr>
+              </a:solidFill>
+              <a:latin typeface="+mn-lt"/>
+              <a:ea typeface="+mn-ea"/>
+              <a:cs typeface="+mn-cs"/>
+            </a:defRPr>
+          </a:pPr>
+          <a:endParaRPr lang="en-US"/>
+        </a:p>
+      </c:txPr>
+    </c:title>
+    <c:autoTitleDeleted val="0"/>
+    <c:plotArea>
+      <c:layout/>
+      <c:barChart>
+        <c:barDir val="col"/>
+        <c:grouping val="clustered"/>
+        <c:varyColors val="0"/>
+        <c:ser>
+          <c:idx val="1"/>
+          <c:order val="0"/>
+          <c:tx>
+            <c:strRef>
+              <c:f>Sheet1!$C$1</c:f>
+              <c:strCache>
+                <c:ptCount val="1"/>
+                <c:pt idx="0">
+                  <c:v>Actual Score</c:v>
+                </c:pt>
+              </c:strCache>
+            </c:strRef>
+          </c:tx>
+          <c:spPr>
+            <a:solidFill>
+              <a:schemeClr val="accent2"/>
+            </a:solidFill>
+            <a:ln>
+              <a:noFill/>
+            </a:ln>
+            <a:effectLst/>
+          </c:spPr>
+          <c:invertIfNegative val="0"/>
+          <c:cat>
+            <c:strRef>
+              <c:f>Sheet1!$A$2:$A$6</c:f>
+              <c:strCache>
+                <c:ptCount val="5"/>
+                <c:pt idx="0">
+                  <c:v>Bad Santa 2</c:v>
+                </c:pt>
+                <c:pt idx="1">
+                  <c:v>Allied</c:v>
+                </c:pt>
+                <c:pt idx="2">
+                  <c:v>Jackie</c:v>
+                </c:pt>
+                <c:pt idx="3">
+                  <c:v>Final Fantasy XV</c:v>
+                </c:pt>
+                <c:pt idx="4">
+                  <c:v>Manchester by the Sea</c:v>
+                </c:pt>
+              </c:strCache>
+            </c:strRef>
+          </c:cat>
+          <c:val>
+            <c:numRef>
+              <c:f>Sheet1!$C$2:$C$6</c:f>
+              <c:numCache>
+                <c:formatCode>General</c:formatCode>
+                <c:ptCount val="5"/>
+                <c:pt idx="0">
+                  <c:v>40</c:v>
+                </c:pt>
+                <c:pt idx="1">
+                  <c:v>60</c:v>
+                </c:pt>
+                <c:pt idx="2">
+                  <c:v>82</c:v>
+                </c:pt>
+                <c:pt idx="3">
+                  <c:v>86</c:v>
+                </c:pt>
+                <c:pt idx="4">
+                  <c:v>96</c:v>
+                </c:pt>
+              </c:numCache>
+            </c:numRef>
+          </c:val>
+          <c:extLst>
+            <c:ext xmlns:c16="http://schemas.microsoft.com/office/drawing/2014/chart" uri="{C3380CC4-5D6E-409C-BE32-E72D297353CC}">
+              <c16:uniqueId val="{00000000-0757-4ED5-8153-91338F0EAF1C}"/>
+            </c:ext>
+          </c:extLst>
+        </c:ser>
+        <c:ser>
+          <c:idx val="0"/>
+          <c:order val="1"/>
+          <c:tx>
+            <c:strRef>
+              <c:f>Sheet1!$B$1</c:f>
+              <c:strCache>
+                <c:ptCount val="1"/>
+                <c:pt idx="0">
+                  <c:v>Predicted Score</c:v>
+                </c:pt>
+              </c:strCache>
+            </c:strRef>
+          </c:tx>
+          <c:spPr>
+            <a:solidFill>
+              <a:schemeClr val="accent1"/>
+            </a:solidFill>
+            <a:ln>
+              <a:noFill/>
+            </a:ln>
+            <a:effectLst/>
+          </c:spPr>
+          <c:invertIfNegative val="0"/>
+          <c:cat>
+            <c:strRef>
+              <c:f>Sheet1!$A$2:$A$6</c:f>
+              <c:strCache>
+                <c:ptCount val="5"/>
+                <c:pt idx="0">
+                  <c:v>Bad Santa 2</c:v>
+                </c:pt>
+                <c:pt idx="1">
+                  <c:v>Allied</c:v>
+                </c:pt>
+                <c:pt idx="2">
+                  <c:v>Jackie</c:v>
+                </c:pt>
+                <c:pt idx="3">
+                  <c:v>Final Fantasy XV</c:v>
+                </c:pt>
+                <c:pt idx="4">
+                  <c:v>Manchester by the Sea</c:v>
+                </c:pt>
+              </c:strCache>
+            </c:strRef>
+          </c:cat>
+          <c:val>
+            <c:numRef>
+              <c:f>Sheet1!$B$2:$B$6</c:f>
+              <c:numCache>
+                <c:formatCode>General</c:formatCode>
+                <c:ptCount val="5"/>
+                <c:pt idx="0">
+                  <c:v>72.67</c:v>
+                </c:pt>
+                <c:pt idx="1">
+                  <c:v>73.569999999999993</c:v>
+                </c:pt>
+                <c:pt idx="2">
+                  <c:v>70.94</c:v>
+                </c:pt>
+                <c:pt idx="3">
+                  <c:v>69.77</c:v>
+                </c:pt>
+                <c:pt idx="4">
+                  <c:v>78.13</c:v>
+                </c:pt>
+              </c:numCache>
+            </c:numRef>
+          </c:val>
+          <c:extLst>
+            <c:ext xmlns:c16="http://schemas.microsoft.com/office/drawing/2014/chart" uri="{C3380CC4-5D6E-409C-BE32-E72D297353CC}">
+              <c16:uniqueId val="{00000001-0757-4ED5-8153-91338F0EAF1C}"/>
+            </c:ext>
+          </c:extLst>
+        </c:ser>
+        <c:dLbls>
+          <c:showLegendKey val="0"/>
+          <c:showVal val="0"/>
+          <c:showCatName val="0"/>
+          <c:showSerName val="0"/>
+          <c:showPercent val="0"/>
+          <c:showBubbleSize val="0"/>
+        </c:dLbls>
+        <c:gapWidth val="219"/>
+        <c:overlap val="-27"/>
+        <c:axId val="447202568"/>
+        <c:axId val="447204864"/>
+      </c:barChart>
+      <c:catAx>
+        <c:axId val="447202568"/>
+        <c:scaling>
+          <c:orientation val="minMax"/>
+        </c:scaling>
+        <c:delete val="0"/>
+        <c:axPos val="b"/>
+        <c:numFmt formatCode="General" sourceLinked="1"/>
+        <c:majorTickMark val="none"/>
+        <c:minorTickMark val="none"/>
+        <c:tickLblPos val="nextTo"/>
+        <c:spPr>
+          <a:noFill/>
+          <a:ln w="9525" cap="flat" cmpd="sng" algn="ctr">
+            <a:solidFill>
+              <a:schemeClr val="tx1">
+                <a:lumMod val="15000"/>
+                <a:lumOff val="85000"/>
+              </a:schemeClr>
+            </a:solidFill>
+            <a:round/>
+          </a:ln>
+          <a:effectLst/>
+        </c:spPr>
+        <c:txPr>
+          <a:bodyPr rot="-60000000" spcFirstLastPara="1" vertOverflow="ellipsis" vert="horz" wrap="square" anchor="ctr" anchorCtr="1"/>
+          <a:lstStyle/>
+          <a:p>
+            <a:pPr>
+              <a:defRPr sz="900" b="0" i="0" u="none" strike="noStrike" kern="1200" baseline="0">
+                <a:solidFill>
+                  <a:schemeClr val="tx1">
+                    <a:lumMod val="65000"/>
+                    <a:lumOff val="35000"/>
+                  </a:schemeClr>
+                </a:solidFill>
+                <a:latin typeface="+mn-lt"/>
+                <a:ea typeface="+mn-ea"/>
+                <a:cs typeface="+mn-cs"/>
+              </a:defRPr>
+            </a:pPr>
+            <a:endParaRPr lang="en-US"/>
+          </a:p>
+        </c:txPr>
+        <c:crossAx val="447204864"/>
+        <c:crosses val="autoZero"/>
+        <c:auto val="1"/>
+        <c:lblAlgn val="ctr"/>
+        <c:lblOffset val="100"/>
+        <c:noMultiLvlLbl val="0"/>
+      </c:catAx>
+      <c:valAx>
+        <c:axId val="447204864"/>
+        <c:scaling>
+          <c:orientation val="minMax"/>
+          <c:max val="100"/>
+        </c:scaling>
+        <c:delete val="0"/>
+        <c:axPos val="l"/>
+        <c:majorGridlines>
+          <c:spPr>
+            <a:ln w="9525" cap="flat" cmpd="sng" algn="ctr">
+              <a:solidFill>
+                <a:schemeClr val="tx1">
+                  <a:lumMod val="15000"/>
+                  <a:lumOff val="85000"/>
+                </a:schemeClr>
+              </a:solidFill>
+              <a:round/>
+            </a:ln>
+            <a:effectLst/>
+          </c:spPr>
+        </c:majorGridlines>
+        <c:numFmt formatCode="General" sourceLinked="1"/>
+        <c:majorTickMark val="none"/>
+        <c:minorTickMark val="none"/>
+        <c:tickLblPos val="nextTo"/>
+        <c:spPr>
+          <a:noFill/>
+          <a:ln>
+            <a:noFill/>
+          </a:ln>
+          <a:effectLst/>
+        </c:spPr>
+        <c:txPr>
+          <a:bodyPr rot="-60000000" spcFirstLastPara="1" vertOverflow="ellipsis" vert="horz" wrap="square" anchor="ctr" anchorCtr="1"/>
+          <a:lstStyle/>
+          <a:p>
+            <a:pPr>
+              <a:defRPr sz="900" b="0" i="0" u="none" strike="noStrike" kern="1200" baseline="0">
+                <a:solidFill>
+                  <a:schemeClr val="tx1">
+                    <a:lumMod val="65000"/>
+                    <a:lumOff val="35000"/>
+                  </a:schemeClr>
+                </a:solidFill>
+                <a:latin typeface="+mn-lt"/>
+                <a:ea typeface="+mn-ea"/>
+                <a:cs typeface="+mn-cs"/>
+              </a:defRPr>
+            </a:pPr>
+            <a:endParaRPr lang="en-US"/>
+          </a:p>
+        </c:txPr>
+        <c:crossAx val="447202568"/>
+        <c:crosses val="autoZero"/>
+        <c:crossBetween val="between"/>
+      </c:valAx>
+      <c:spPr>
+        <a:noFill/>
+        <a:ln>
+          <a:noFill/>
+        </a:ln>
+        <a:effectLst/>
+      </c:spPr>
+    </c:plotArea>
+    <c:legend>
+      <c:legendPos val="b"/>
+      <c:overlay val="0"/>
+      <c:spPr>
+        <a:noFill/>
+        <a:ln>
+          <a:noFill/>
+        </a:ln>
+        <a:effectLst/>
+      </c:spPr>
+      <c:txPr>
+        <a:bodyPr rot="0" spcFirstLastPara="1" vertOverflow="ellipsis" vert="horz" wrap="square" anchor="ctr" anchorCtr="1"/>
+        <a:lstStyle/>
+        <a:p>
+          <a:pPr>
+            <a:defRPr sz="900" b="0" i="0" u="none" strike="noStrike" kern="1200" baseline="0">
+              <a:solidFill>
+                <a:schemeClr val="tx1">
+                  <a:lumMod val="65000"/>
+                  <a:lumOff val="35000"/>
+                </a:schemeClr>
+              </a:solidFill>
+              <a:latin typeface="+mn-lt"/>
+              <a:ea typeface="+mn-ea"/>
+              <a:cs typeface="+mn-cs"/>
+            </a:defRPr>
+          </a:pPr>
+          <a:endParaRPr lang="en-US"/>
+        </a:p>
+      </c:txPr>
+    </c:legend>
+    <c:plotVisOnly val="1"/>
+    <c:dispBlanksAs val="gap"/>
+    <c:showDLblsOverMax val="0"/>
+  </c:chart>
+  <c:spPr>
+    <a:noFill/>
+    <a:ln>
+      <a:noFill/>
+    </a:ln>
+    <a:effectLst/>
+  </c:spPr>
+  <c:txPr>
+    <a:bodyPr/>
+    <a:lstStyle/>
+    <a:p>
+      <a:pPr>
+        <a:defRPr/>
+      </a:pPr>
+      <a:endParaRPr lang="en-US"/>
+    </a:p>
+  </c:txPr>
+  <c:externalData r:id="rId3">
+    <c:autoUpdate val="0"/>
+  </c:externalData>
+</c:chartSpace>
+</file>
+
+<file path=ppt/charts/colors1.xml><?xml version="1.0" encoding="utf-8"?>
+<cs:colorStyle xmlns:cs="http://schemas.microsoft.com/office/drawing/2012/chartStyle" xmlns:a="http://schemas.openxmlformats.org/drawingml/2006/main" meth="cycle" id="10">
+  <a:schemeClr val="accent1"/>
+  <a:schemeClr val="accent2"/>
+  <a:schemeClr val="accent3"/>
+  <a:schemeClr val="accent4"/>
+  <a:schemeClr val="accent5"/>
+  <a:schemeClr val="accent6"/>
+  <cs:variation/>
+  <cs:variation>
+    <a:lumMod val="60000"/>
+  </cs:variation>
+  <cs:variation>
+    <a:lumMod val="80000"/>
+    <a:lumOff val="20000"/>
+  </cs:variation>
+  <cs:variation>
+    <a:lumMod val="80000"/>
+  </cs:variation>
+  <cs:variation>
+    <a:lumMod val="60000"/>
+    <a:lumOff val="40000"/>
+  </cs:variation>
+  <cs:variation>
+    <a:lumMod val="50000"/>
+  </cs:variation>
+  <cs:variation>
+    <a:lumMod val="70000"/>
+    <a:lumOff val="30000"/>
+  </cs:variation>
+  <cs:variation>
+    <a:lumMod val="70000"/>
+  </cs:variation>
+  <cs:variation>
+    <a:lumMod val="50000"/>
+    <a:lumOff val="50000"/>
+  </cs:variation>
+</cs:colorStyle>
+</file>
+
+<file path=ppt/charts/style1.xml><?xml version="1.0" encoding="utf-8"?>
+<cs:chartStyle xmlns:cs="http://schemas.microsoft.com/office/drawing/2012/chartStyle" xmlns:a="http://schemas.openxmlformats.org/drawingml/2006/main" id="201">
+  <cs:axisTitle>
+    <cs:lnRef idx="0"/>
+    <cs:fillRef idx="0"/>
+    <cs:effectRef idx="0"/>
+    <cs:fontRef idx="minor">
+      <a:schemeClr val="tx1">
+        <a:lumMod val="65000"/>
+        <a:lumOff val="35000"/>
+      </a:schemeClr>
+    </cs:fontRef>
+    <cs:defRPr sz="1000" kern="1200"/>
+  </cs:axisTitle>
+  <cs:categoryAxis>
+    <cs:lnRef idx="0"/>
+    <cs:fillRef idx="0"/>
+    <cs:effectRef idx="0"/>
+    <cs:fontRef idx="minor">
+      <a:schemeClr val="tx1">
+        <a:lumMod val="65000"/>
+        <a:lumOff val="35000"/>
+      </a:schemeClr>
+    </cs:fontRef>
+    <cs:spPr>
+      <a:ln w="9525" cap="flat" cmpd="sng" algn="ctr">
+        <a:solidFill>
+          <a:schemeClr val="tx1">
+            <a:lumMod val="15000"/>
+            <a:lumOff val="85000"/>
+          </a:schemeClr>
+        </a:solidFill>
+        <a:round/>
+      </a:ln>
+    </cs:spPr>
+    <cs:defRPr sz="900" kern="1200"/>
+  </cs:categoryAxis>
+  <cs:chartArea mods="allowNoFillOverride allowNoLineOverride">
+    <cs:lnRef idx="0"/>
+    <cs:fillRef idx="0"/>
+    <cs:effectRef idx="0"/>
+    <cs:fontRef idx="minor">
+      <a:schemeClr val="tx1"/>
+    </cs:fontRef>
+    <cs:spPr>
+      <a:solidFill>
+        <a:schemeClr val="bg1"/>
+      </a:solidFill>
+      <a:ln w="9525" cap="flat" cmpd="sng" algn="ctr">
+        <a:solidFill>
+          <a:schemeClr val="tx1">
+            <a:lumMod val="15000"/>
+            <a:lumOff val="85000"/>
+          </a:schemeClr>
+        </a:solidFill>
+        <a:round/>
+      </a:ln>
+    </cs:spPr>
+    <cs:defRPr sz="1000" kern="1200"/>
+  </cs:chartArea>
+  <cs:dataLabel>
+    <cs:lnRef idx="0"/>
+    <cs:fillRef idx="0"/>
+    <cs:effectRef idx="0"/>
+    <cs:fontRef idx="minor">
+      <a:schemeClr val="tx1">
+        <a:lumMod val="75000"/>
+        <a:lumOff val="25000"/>
+      </a:schemeClr>
+    </cs:fontRef>
+    <cs:defRPr sz="900" kern="1200"/>
+  </cs:dataLabel>
+  <cs:dataLabelCallout>
+    <cs:lnRef idx="0"/>
+    <cs:fillRef idx="0"/>
+    <cs:effectRef idx="0"/>
+    <cs:fontRef idx="minor">
+      <a:schemeClr val="dk1">
+        <a:lumMod val="65000"/>
+        <a:lumOff val="35000"/>
+      </a:schemeClr>
+    </cs:fontRef>
+    <cs:spPr>
+      <a:solidFill>
+        <a:schemeClr val="lt1"/>
+      </a:solidFill>
+      <a:ln>
+        <a:solidFill>
+          <a:schemeClr val="dk1">
+            <a:lumMod val="25000"/>
+            <a:lumOff val="75000"/>
+          </a:schemeClr>
+        </a:solidFill>
+      </a:ln>
+    </cs:spPr>
+    <cs:defRPr sz="900" kern="1200"/>
+    <cs:bodyPr rot="0" spcFirstLastPara="1" vertOverflow="clip" horzOverflow="clip" vert="horz" wrap="square" lIns="36576" tIns="18288" rIns="36576" bIns="18288" anchor="ctr" anchorCtr="1">
+      <a:spAutoFit/>
+    </cs:bodyPr>
+  </cs:dataLabelCallout>
+  <cs:dataPoint>
+    <cs:lnRef idx="0"/>
+    <cs:fillRef idx="1">
+      <cs:styleClr val="auto"/>
+    </cs:fillRef>
+    <cs:effectRef idx="0"/>
+    <cs:fontRef idx="minor">
+      <a:schemeClr val="tx1"/>
+    </cs:fontRef>
+  </cs:dataPoint>
+  <cs:dataPoint3D>
+    <cs:lnRef idx="0"/>
+    <cs:fillRef idx="1">
+      <cs:styleClr val="auto"/>
+    </cs:fillRef>
+    <cs:effectRef idx="0"/>
+    <cs:fontRef idx="minor">
+      <a:schemeClr val="tx1"/>
+    </cs:fontRef>
+  </cs:dataPoint3D>
+  <cs:dataPointLine>
+    <cs:lnRef idx="0">
+      <cs:styleClr val="auto"/>
+    </cs:lnRef>
+    <cs:fillRef idx="1"/>
+    <cs:effectRef idx="0"/>
+    <cs:fontRef idx="minor">
+      <a:schemeClr val="tx1"/>
+    </cs:fontRef>
+    <cs:spPr>
+      <a:ln w="28575" cap="rnd">
+        <a:solidFill>
+          <a:schemeClr val="phClr"/>
+        </a:solidFill>
+        <a:round/>
+      </a:ln>
+    </cs:spPr>
+  </cs:dataPointLine>
+  <cs:dataPointMarker>
+    <cs:lnRef idx="0">
+      <cs:styleClr val="auto"/>
+    </cs:lnRef>
+    <cs:fillRef idx="1">
+      <cs:styleClr val="auto"/>
+    </cs:fillRef>
+    <cs:effectRef idx="0"/>
+    <cs:fontRef idx="minor">
+      <a:schemeClr val="tx1"/>
+    </cs:fontRef>
+    <cs:spPr>
+      <a:ln w="9525">
+        <a:solidFill>
+          <a:schemeClr val="phClr"/>
+        </a:solidFill>
+      </a:ln>
+    </cs:spPr>
+  </cs:dataPointMarker>
+  <cs:dataPointMarkerLayout symbol="circle" size="5"/>
+  <cs:dataPointWireframe>
+    <cs:lnRef idx="0">
+      <cs:styleClr val="auto"/>
+    </cs:lnRef>
+    <cs:fillRef idx="1"/>
+    <cs:effectRef idx="0"/>
+    <cs:fontRef idx="minor">
+      <a:schemeClr val="tx1"/>
+    </cs:fontRef>
+    <cs:spPr>
+      <a:ln w="9525" cap="rnd">
+        <a:solidFill>
+          <a:schemeClr val="phClr"/>
+        </a:solidFill>
+        <a:round/>
+      </a:ln>
+    </cs:spPr>
+  </cs:dataPointWireframe>
+  <cs:dataTable>
+    <cs:lnRef idx="0"/>
+    <cs:fillRef idx="0"/>
+    <cs:effectRef idx="0"/>
+    <cs:fontRef idx="minor">
+      <a:schemeClr val="tx1">
+        <a:lumMod val="65000"/>
+        <a:lumOff val="35000"/>
+      </a:schemeClr>
+    </cs:fontRef>
+    <cs:spPr>
+      <a:noFill/>
+      <a:ln w="9525" cap="flat" cmpd="sng" algn="ctr">
+        <a:solidFill>
+          <a:schemeClr val="tx1">
+            <a:lumMod val="15000"/>
+            <a:lumOff val="85000"/>
+          </a:schemeClr>
+        </a:solidFill>
+        <a:round/>
+      </a:ln>
+    </cs:spPr>
+    <cs:defRPr sz="900" kern="1200"/>
+  </cs:dataTable>
+  <cs:downBar>
+    <cs:lnRef idx="0"/>
+    <cs:fillRef idx="0"/>
+    <cs:effectRef idx="0"/>
+    <cs:fontRef idx="minor">
+      <a:schemeClr val="dk1"/>
+    </cs:fontRef>
+    <cs:spPr>
+      <a:solidFill>
+        <a:schemeClr val="dk1">
+          <a:lumMod val="65000"/>
+          <a:lumOff val="35000"/>
+        </a:schemeClr>
+      </a:solidFill>
+      <a:ln w="9525">
+        <a:solidFill>
+          <a:schemeClr val="tx1">
+            <a:lumMod val="65000"/>
+            <a:lumOff val="35000"/>
+          </a:schemeClr>
+        </a:solidFill>
+      </a:ln>
+    </cs:spPr>
+  </cs:downBar>
+  <cs:dropLine>
+    <cs:lnRef idx="0"/>
+    <cs:fillRef idx="0"/>
+    <cs:effectRef idx="0"/>
+    <cs:fontRef idx="minor">
+      <a:schemeClr val="tx1"/>
+    </cs:fontRef>
+    <cs:spPr>
+      <a:ln w="9525" cap="flat" cmpd="sng" algn="ctr">
+        <a:solidFill>
+          <a:schemeClr val="tx1">
+            <a:lumMod val="35000"/>
+            <a:lumOff val="65000"/>
+          </a:schemeClr>
+        </a:solidFill>
+        <a:round/>
+      </a:ln>
+    </cs:spPr>
+  </cs:dropLine>
+  <cs:errorBar>
+    <cs:lnRef idx="0"/>
+    <cs:fillRef idx="0"/>
+    <cs:effectRef idx="0"/>
+    <cs:fontRef idx="minor">
+      <a:schemeClr val="tx1"/>
+    </cs:fontRef>
+    <cs:spPr>
+      <a:ln w="9525" cap="flat" cmpd="sng" algn="ctr">
+        <a:solidFill>
+          <a:schemeClr val="tx1">
+            <a:lumMod val="65000"/>
+            <a:lumOff val="35000"/>
+          </a:schemeClr>
+        </a:solidFill>
+        <a:round/>
+      </a:ln>
+    </cs:spPr>
+  </cs:errorBar>
+  <cs:floor>
+    <cs:lnRef idx="0"/>
+    <cs:fillRef idx="0"/>
+    <cs:effectRef idx="0"/>
+    <cs:fontRef idx="minor">
+      <a:schemeClr val="tx1"/>
+    </cs:fontRef>
+    <cs:spPr>
+      <a:noFill/>
+      <a:ln>
+        <a:noFill/>
+      </a:ln>
+    </cs:spPr>
+  </cs:floor>
+  <cs:gridlineMajor>
+    <cs:lnRef idx="0"/>
+    <cs:fillRef idx="0"/>
+    <cs:effectRef idx="0"/>
+    <cs:fontRef idx="minor">
+      <a:schemeClr val="tx1"/>
+    </cs:fontRef>
+    <cs:spPr>
+      <a:ln w="9525" cap="flat" cmpd="sng" algn="ctr">
+        <a:solidFill>
+          <a:schemeClr val="tx1">
+            <a:lumMod val="15000"/>
+            <a:lumOff val="85000"/>
+          </a:schemeClr>
+        </a:solidFill>
+        <a:round/>
+      </a:ln>
+    </cs:spPr>
+  </cs:gridlineMajor>
+  <cs:gridlineMinor>
+    <cs:lnRef idx="0"/>
+    <cs:fillRef idx="0"/>
+    <cs:effectRef idx="0"/>
+    <cs:fontRef idx="minor">
+      <a:schemeClr val="tx1"/>
+    </cs:fontRef>
+    <cs:spPr>
+      <a:ln w="9525" cap="flat" cmpd="sng" algn="ctr">
+        <a:solidFill>
+          <a:schemeClr val="tx1">
+            <a:lumMod val="5000"/>
+            <a:lumOff val="95000"/>
+          </a:schemeClr>
+        </a:solidFill>
+        <a:round/>
+      </a:ln>
+    </cs:spPr>
+  </cs:gridlineMinor>
+  <cs:hiLoLine>
+    <cs:lnRef idx="0"/>
+    <cs:fillRef idx="0"/>
+    <cs:effectRef idx="0"/>
+    <cs:fontRef idx="minor">
+      <a:schemeClr val="tx1"/>
+    </cs:fontRef>
+    <cs:spPr>
+      <a:ln w="9525" cap="flat" cmpd="sng" algn="ctr">
+        <a:solidFill>
+          <a:schemeClr val="tx1">
+            <a:lumMod val="75000"/>
+            <a:lumOff val="25000"/>
+          </a:schemeClr>
+        </a:solidFill>
+        <a:round/>
+      </a:ln>
+    </cs:spPr>
+  </cs:hiLoLine>
+  <cs:leaderLine>
+    <cs:lnRef idx="0"/>
+    <cs:fillRef idx="0"/>
+    <cs:effectRef idx="0"/>
+    <cs:fontRef idx="minor">
+      <a:schemeClr val="tx1"/>
+    </cs:fontRef>
+    <cs:spPr>
+      <a:ln w="9525" cap="flat" cmpd="sng" algn="ctr">
+        <a:solidFill>
+          <a:schemeClr val="tx1">
+            <a:lumMod val="35000"/>
+            <a:lumOff val="65000"/>
+          </a:schemeClr>
+        </a:solidFill>
+        <a:round/>
+      </a:ln>
+    </cs:spPr>
+  </cs:leaderLine>
+  <cs:legend>
+    <cs:lnRef idx="0"/>
+    <cs:fillRef idx="0"/>
+    <cs:effectRef idx="0"/>
+    <cs:fontRef idx="minor">
+      <a:schemeClr val="tx1">
+        <a:lumMod val="65000"/>
+        <a:lumOff val="35000"/>
+      </a:schemeClr>
+    </cs:fontRef>
+    <cs:defRPr sz="900" kern="1200"/>
+  </cs:legend>
+  <cs:plotArea mods="allowNoFillOverride allowNoLineOverride">
+    <cs:lnRef idx="0"/>
+    <cs:fillRef idx="0"/>
+    <cs:effectRef idx="0"/>
+    <cs:fontRef idx="minor">
+      <a:schemeClr val="tx1"/>
+    </cs:fontRef>
+  </cs:plotArea>
+  <cs:plotArea3D mods="allowNoFillOverride allowNoLineOverride">
+    <cs:lnRef idx="0"/>
+    <cs:fillRef idx="0"/>
+    <cs:effectRef idx="0"/>
+    <cs:fontRef idx="minor">
+      <a:schemeClr val="tx1"/>
+    </cs:fontRef>
+  </cs:plotArea3D>
+  <cs:seriesAxis>
+    <cs:lnRef idx="0"/>
+    <cs:fillRef idx="0"/>
+    <cs:effectRef idx="0"/>
+    <cs:fontRef idx="minor">
+      <a:schemeClr val="tx1">
+        <a:lumMod val="65000"/>
+        <a:lumOff val="35000"/>
+      </a:schemeClr>
+    </cs:fontRef>
+    <cs:defRPr sz="900" kern="1200"/>
+  </cs:seriesAxis>
+  <cs:seriesLine>
+    <cs:lnRef idx="0"/>
+    <cs:fillRef idx="0"/>
+    <cs:effectRef idx="0"/>
+    <cs:fontRef idx="minor">
+      <a:schemeClr val="tx1"/>
+    </cs:fontRef>
+    <cs:spPr>
+      <a:ln w="9525" cap="flat" cmpd="sng" algn="ctr">
+        <a:solidFill>
+          <a:schemeClr val="tx1">
+            <a:lumMod val="35000"/>
+            <a:lumOff val="65000"/>
+          </a:schemeClr>
+        </a:solidFill>
+        <a:round/>
+      </a:ln>
+    </cs:spPr>
+  </cs:seriesLine>
+  <cs:title>
+    <cs:lnRef idx="0"/>
+    <cs:fillRef idx="0"/>
+    <cs:effectRef idx="0"/>
+    <cs:fontRef idx="minor">
+      <a:schemeClr val="tx1">
+        <a:lumMod val="65000"/>
+        <a:lumOff val="35000"/>
+      </a:schemeClr>
+    </cs:fontRef>
+    <cs:defRPr sz="1400" b="0" kern="1200" spc="0" baseline="0"/>
+  </cs:title>
+  <cs:trendline>
+    <cs:lnRef idx="0">
+      <cs:styleClr val="auto"/>
+    </cs:lnRef>
+    <cs:fillRef idx="0"/>
+    <cs:effectRef idx="0"/>
+    <cs:fontRef idx="minor">
+      <a:schemeClr val="tx1"/>
+    </cs:fontRef>
+    <cs:spPr>
+      <a:ln w="19050" cap="rnd">
+        <a:solidFill>
+          <a:schemeClr val="phClr"/>
+        </a:solidFill>
+        <a:prstDash val="sysDot"/>
+      </a:ln>
+    </cs:spPr>
+  </cs:trendline>
+  <cs:trendlineLabel>
+    <cs:lnRef idx="0"/>
+    <cs:fillRef idx="0"/>
+    <cs:effectRef idx="0"/>
+    <cs:fontRef idx="minor">
+      <a:schemeClr val="tx1">
+        <a:lumMod val="65000"/>
+        <a:lumOff val="35000"/>
+      </a:schemeClr>
+    </cs:fontRef>
+    <cs:defRPr sz="900" kern="1200"/>
+  </cs:trendlineLabel>
+  <cs:upBar>
+    <cs:lnRef idx="0"/>
+    <cs:fillRef idx="0"/>
+    <cs:effectRef idx="0"/>
+    <cs:fontRef idx="minor">
+      <a:schemeClr val="dk1"/>
+    </cs:fontRef>
+    <cs:spPr>
+      <a:solidFill>
+        <a:schemeClr val="lt1"/>
+      </a:solidFill>
+      <a:ln w="9525">
+        <a:solidFill>
+          <a:schemeClr val="tx1">
+            <a:lumMod val="15000"/>
+            <a:lumOff val="85000"/>
+          </a:schemeClr>
+        </a:solidFill>
+      </a:ln>
+    </cs:spPr>
+  </cs:upBar>
+  <cs:valueAxis>
+    <cs:lnRef idx="0"/>
+    <cs:fillRef idx="0"/>
+    <cs:effectRef idx="0"/>
+    <cs:fontRef idx="minor">
+      <a:schemeClr val="tx1">
+        <a:lumMod val="65000"/>
+        <a:lumOff val="35000"/>
+      </a:schemeClr>
+    </cs:fontRef>
+    <cs:defRPr sz="900" kern="1200"/>
+  </cs:valueAxis>
+  <cs:wall>
+    <cs:lnRef idx="0"/>
+    <cs:fillRef idx="0"/>
+    <cs:effectRef idx="0"/>
+    <cs:fontRef idx="minor">
+      <a:schemeClr val="tx1"/>
+    </cs:fontRef>
+    <cs:spPr>
+      <a:noFill/>
+      <a:ln>
+        <a:noFill/>
+      </a:ln>
+    </cs:spPr>
+  </cs:wall>
+</cs:chartStyle>
+</file>
+
 <file path=ppt/slideLayouts/slideLayout1.xml><?xml version="1.0" encoding="utf-8"?>
 <p:sldLayout xmlns:a="http://schemas.openxmlformats.org/drawingml/2006/main" xmlns:r="http://schemas.openxmlformats.org/officeDocument/2006/relationships" xmlns:p="http://schemas.openxmlformats.org/presentationml/2006/main" type="title" preserve="1">
   <p:cSld name="Title Slide">
@@ -257,7 +1228,7 @@
           <a:p>
             <a:fld id="{48A87A34-81AB-432B-8DAE-1953F412C126}" type="datetimeFigureOut">
               <a:rPr lang="en-US" dirty="0"/>
-              <a:t>10/17/2016</a:t>
+              <a:t>11/30/2016</a:t>
             </a:fld>
             <a:endParaRPr lang="en-US" dirty="0"/>
           </a:p>
@@ -463,7 +1434,7 @@
           <a:p>
             <a:fld id="{48A87A34-81AB-432B-8DAE-1953F412C126}" type="datetimeFigureOut">
               <a:rPr lang="en-US" dirty="0"/>
-              <a:t>10/17/2016</a:t>
+              <a:t>11/30/2016</a:t>
             </a:fld>
             <a:endParaRPr lang="en-US" dirty="0"/>
           </a:p>
@@ -673,7 +1644,7 @@
           <a:p>
             <a:fld id="{48A87A34-81AB-432B-8DAE-1953F412C126}" type="datetimeFigureOut">
               <a:rPr lang="en-US" dirty="0"/>
-              <a:t>10/17/2016</a:t>
+              <a:t>11/30/2016</a:t>
             </a:fld>
             <a:endParaRPr lang="en-US" dirty="0"/>
           </a:p>
@@ -869,7 +1840,7 @@
           <a:p>
             <a:fld id="{48A87A34-81AB-432B-8DAE-1953F412C126}" type="datetimeFigureOut">
               <a:rPr lang="en-US" dirty="0"/>
-              <a:t>10/17/2016</a:t>
+              <a:t>11/30/2016</a:t>
             </a:fld>
             <a:endParaRPr lang="en-US" dirty="0"/>
           </a:p>
@@ -1143,7 +2114,7 @@
           <a:p>
             <a:fld id="{48A87A34-81AB-432B-8DAE-1953F412C126}" type="datetimeFigureOut">
               <a:rPr lang="en-US" dirty="0"/>
-              <a:t>10/17/2016</a:t>
+              <a:t>11/30/2016</a:t>
             </a:fld>
             <a:endParaRPr lang="en-US" dirty="0"/>
           </a:p>
@@ -1406,7 +2377,7 @@
           <a:p>
             <a:fld id="{48A87A34-81AB-432B-8DAE-1953F412C126}" type="datetimeFigureOut">
               <a:rPr lang="en-US" dirty="0"/>
-              <a:t>10/17/2016</a:t>
+              <a:t>11/30/2016</a:t>
             </a:fld>
             <a:endParaRPr lang="en-US" dirty="0"/>
           </a:p>
@@ -1817,7 +2788,7 @@
           <a:p>
             <a:fld id="{48A87A34-81AB-432B-8DAE-1953F412C126}" type="datetimeFigureOut">
               <a:rPr lang="en-US" dirty="0"/>
-              <a:t>10/17/2016</a:t>
+              <a:t>11/30/2016</a:t>
             </a:fld>
             <a:endParaRPr lang="en-US" dirty="0"/>
           </a:p>
@@ -1961,7 +2932,7 @@
           <a:p>
             <a:fld id="{48A87A34-81AB-432B-8DAE-1953F412C126}" type="datetimeFigureOut">
               <a:rPr lang="en-US" dirty="0"/>
-              <a:t>10/17/2016</a:t>
+              <a:t>11/30/2016</a:t>
             </a:fld>
             <a:endParaRPr lang="en-US" dirty="0"/>
           </a:p>
@@ -2082,7 +3053,7 @@
           <a:p>
             <a:fld id="{48A87A34-81AB-432B-8DAE-1953F412C126}" type="datetimeFigureOut">
               <a:rPr lang="en-US" dirty="0"/>
-              <a:t>10/17/2016</a:t>
+              <a:t>11/30/2016</a:t>
             </a:fld>
             <a:endParaRPr lang="en-US" dirty="0"/>
           </a:p>
@@ -2328,7 +3299,7 @@
           <a:p>
             <a:fld id="{48A87A34-81AB-432B-8DAE-1953F412C126}" type="datetimeFigureOut">
               <a:rPr lang="en-US" dirty="0"/>
-              <a:t>10/17/2016</a:t>
+              <a:t>11/30/2016</a:t>
             </a:fld>
             <a:endParaRPr lang="en-US" dirty="0"/>
           </a:p>
@@ -2769,7 +3740,7 @@
             <a:fld id="{48A87A34-81AB-432B-8DAE-1953F412C126}" type="datetimeFigureOut">
               <a:rPr lang="en-US" dirty="0"/>
               <a:pPr/>
-              <a:t>10/17/2016</a:t>
+              <a:t>11/30/2016</a:t>
             </a:fld>
             <a:endParaRPr lang="en-US" dirty="0"/>
           </a:p>
@@ -3091,7 +4062,7 @@
             <a:fld id="{48A87A34-81AB-432B-8DAE-1953F412C126}" type="datetimeFigureOut">
               <a:rPr lang="en-US" dirty="0"/>
               <a:pPr/>
-              <a:t>10/17/2016</a:t>
+              <a:t>11/30/2016</a:t>
             </a:fld>
             <a:endParaRPr lang="en-US" dirty="0"/>
           </a:p>
@@ -3583,45 +4554,39 @@
             <p:ph type="ctrTitle"/>
           </p:nvPr>
         </p:nvSpPr>
-        <p:spPr/>
-        <p:txBody>
-          <a:bodyPr>
-            <a:normAutofit fontScale="90000"/>
-          </a:bodyPr>
-          <a:lstStyle/>
-          <a:p>
-            <a:r>
-              <a:rPr lang="en-US" u="sng" dirty="0"/>
-              <a:t>Project 3 Proposal</a:t>
-            </a:r>
-            <a:br>
-              <a:rPr lang="en-US" dirty="0"/>
-            </a:br>
-            <a:r>
-              <a:rPr lang="en-US" dirty="0" err="1"/>
-              <a:t>MetaCritic</a:t>
-            </a:r>
-            <a:r>
-              <a:rPr lang="en-US" dirty="0"/>
-              <a:t> Score Predictor</a:t>
-            </a:r>
-          </a:p>
-        </p:txBody>
-      </p:sp>
-      <p:sp>
-        <p:nvSpPr>
-          <p:cNvPr id="3" name="Subtitle 2"/>
-          <p:cNvSpPr>
-            <a:spLocks noGrp="1"/>
-          </p:cNvSpPr>
-          <p:nvPr>
-            <p:ph type="subTitle" idx="1"/>
-          </p:nvPr>
-        </p:nvSpPr>
         <p:spPr>
           <a:xfrm>
-            <a:off x="2417780" y="3531204"/>
-            <a:ext cx="8637072" cy="1684263"/>
+            <a:off x="2370667" y="802298"/>
+            <a:ext cx="9160934" cy="2541431"/>
+          </a:xfrm>
+        </p:spPr>
+        <p:txBody>
+          <a:bodyPr>
+            <a:normAutofit/>
+          </a:bodyPr>
+          <a:lstStyle/>
+          <a:p>
+            <a:r>
+              <a:rPr lang="en-US" sz="4800" dirty="0"/>
+              <a:t>Using Twitter and Sentiment Analysis to Predict Metacritic Scores</a:t>
+            </a:r>
+          </a:p>
+        </p:txBody>
+      </p:sp>
+      <p:sp>
+        <p:nvSpPr>
+          <p:cNvPr id="3" name="Subtitle 2"/>
+          <p:cNvSpPr>
+            <a:spLocks noGrp="1"/>
+          </p:cNvSpPr>
+          <p:nvPr>
+            <p:ph type="subTitle" idx="1"/>
+          </p:nvPr>
+        </p:nvSpPr>
+        <p:spPr>
+          <a:xfrm>
+            <a:off x="2370667" y="3531204"/>
+            <a:ext cx="9113820" cy="1684263"/>
           </a:xfrm>
         </p:spPr>
         <p:txBody>
@@ -3656,6 +4621,579 @@
     <p:extLst>
       <p:ext uri="{BB962C8B-B14F-4D97-AF65-F5344CB8AC3E}">
         <p14:creationId xmlns:p14="http://schemas.microsoft.com/office/powerpoint/2010/main" val="1119770342"/>
+      </p:ext>
+    </p:extLst>
+  </p:cSld>
+  <p:clrMapOvr>
+    <a:masterClrMapping/>
+  </p:clrMapOvr>
+</p:sld>
+</file>
+
+<file path=ppt/slides/slide10.xml><?xml version="1.0" encoding="utf-8"?>
+<p:sld xmlns:a="http://schemas.openxmlformats.org/drawingml/2006/main" xmlns:r="http://schemas.openxmlformats.org/officeDocument/2006/relationships" xmlns:p="http://schemas.openxmlformats.org/presentationml/2006/main">
+  <p:cSld>
+    <p:spTree>
+      <p:nvGrpSpPr>
+        <p:cNvPr id="1" name=""/>
+        <p:cNvGrpSpPr/>
+        <p:nvPr/>
+      </p:nvGrpSpPr>
+      <p:grpSpPr>
+        <a:xfrm>
+          <a:off x="0" y="0"/>
+          <a:ext cx="0" cy="0"/>
+          <a:chOff x="0" y="0"/>
+          <a:chExt cx="0" cy="0"/>
+        </a:xfrm>
+      </p:grpSpPr>
+      <p:sp>
+        <p:nvSpPr>
+          <p:cNvPr id="2" name="Title 1"/>
+          <p:cNvSpPr>
+            <a:spLocks noGrp="1"/>
+          </p:cNvSpPr>
+          <p:nvPr>
+            <p:ph type="title"/>
+          </p:nvPr>
+        </p:nvSpPr>
+        <p:spPr/>
+        <p:txBody>
+          <a:bodyPr/>
+          <a:lstStyle/>
+          <a:p>
+            <a:r>
+              <a:rPr lang="en-US" dirty="0"/>
+              <a:t>Model Quantitative Evaluation</a:t>
+            </a:r>
+          </a:p>
+        </p:txBody>
+      </p:sp>
+      <p:graphicFrame>
+        <p:nvGraphicFramePr>
+          <p:cNvPr id="4" name="Content Placeholder 3">
+            <a:extLst>
+              <a:ext uri="{FF2B5EF4-FFF2-40B4-BE49-F238E27FC236}">
+                <a16:creationId xmlns:a16="http://schemas.microsoft.com/office/drawing/2014/main" id="{EE7EF33F-AE18-4A7B-9A57-C35DF76CC456}"/>
+              </a:ext>
+            </a:extLst>
+          </p:cNvPr>
+          <p:cNvGraphicFramePr>
+            <a:graphicFrameLocks noGrp="1"/>
+          </p:cNvGraphicFramePr>
+          <p:nvPr>
+            <p:ph idx="1"/>
+            <p:extLst>
+              <p:ext uri="{D42A27DB-BD31-4B8C-83A1-F6EECF244321}">
+                <p14:modId xmlns:p14="http://schemas.microsoft.com/office/powerpoint/2010/main" val="4011865183"/>
+              </p:ext>
+            </p:extLst>
+          </p:nvPr>
+        </p:nvGraphicFramePr>
+        <p:xfrm>
+          <a:off x="1450975" y="2016125"/>
+          <a:ext cx="9604375" cy="3210968"/>
+        </p:xfrm>
+        <a:graphic>
+          <a:graphicData uri="http://schemas.openxmlformats.org/drawingml/2006/chart">
+            <c:chart xmlns:c="http://schemas.openxmlformats.org/drawingml/2006/chart" xmlns:r="http://schemas.openxmlformats.org/officeDocument/2006/relationships" r:id="rId2"/>
+          </a:graphicData>
+        </a:graphic>
+      </p:graphicFrame>
+      <p:sp>
+        <p:nvSpPr>
+          <p:cNvPr id="5" name="Content Placeholder 2"/>
+          <p:cNvSpPr txBox="1">
+            <a:spLocks/>
+          </p:cNvSpPr>
+          <p:nvPr/>
+        </p:nvSpPr>
+        <p:spPr>
+          <a:xfrm>
+            <a:off x="959600" y="5227093"/>
+            <a:ext cx="10532534" cy="752029"/>
+          </a:xfrm>
+          <a:prstGeom prst="rect">
+            <a:avLst/>
+          </a:prstGeom>
+        </p:spPr>
+        <p:txBody>
+          <a:bodyPr vert="horz" lIns="91440" tIns="45720" rIns="91440" bIns="45720" rtlCol="0" anchor="t">
+            <a:normAutofit/>
+          </a:bodyPr>
+          <a:lstStyle>
+            <a:lvl1pPr marL="228600" indent="-228600" algn="l" defTabSz="914400" rtl="0" eaLnBrk="1" latinLnBrk="0" hangingPunct="1">
+              <a:lnSpc>
+                <a:spcPct val="120000"/>
+              </a:lnSpc>
+              <a:spcBef>
+                <a:spcPts val="1000"/>
+              </a:spcBef>
+              <a:buClr>
+                <a:schemeClr val="accent1"/>
+              </a:buClr>
+              <a:buSzPct val="100000"/>
+              <a:buFont typeface="Arial" panose="020B0604020202020204" pitchFamily="34" charset="0"/>
+              <a:buChar char="•"/>
+              <a:defRPr sz="2000" kern="1200">
+                <a:solidFill>
+                  <a:schemeClr val="tx1"/>
+                </a:solidFill>
+                <a:effectLst/>
+                <a:latin typeface="+mn-lt"/>
+                <a:ea typeface="+mn-ea"/>
+                <a:cs typeface="+mn-cs"/>
+              </a:defRPr>
+            </a:lvl1pPr>
+            <a:lvl2pPr marL="685800" indent="-228600" algn="l" defTabSz="914400" rtl="0" eaLnBrk="1" latinLnBrk="0" hangingPunct="1">
+              <a:lnSpc>
+                <a:spcPct val="120000"/>
+              </a:lnSpc>
+              <a:spcBef>
+                <a:spcPts val="500"/>
+              </a:spcBef>
+              <a:buClr>
+                <a:schemeClr val="accent1"/>
+              </a:buClr>
+              <a:buSzPct val="100000"/>
+              <a:buFont typeface="Arial" panose="020B0604020202020204" pitchFamily="34" charset="0"/>
+              <a:buChar char="•"/>
+              <a:defRPr sz="1800" kern="1200" cap="none" baseline="0">
+                <a:solidFill>
+                  <a:schemeClr val="tx1"/>
+                </a:solidFill>
+                <a:effectLst/>
+                <a:latin typeface="+mn-lt"/>
+                <a:ea typeface="+mn-ea"/>
+                <a:cs typeface="+mn-cs"/>
+              </a:defRPr>
+            </a:lvl2pPr>
+            <a:lvl3pPr marL="1143000" indent="-228600" algn="l" defTabSz="914400" rtl="0" eaLnBrk="1" latinLnBrk="0" hangingPunct="1">
+              <a:lnSpc>
+                <a:spcPct val="120000"/>
+              </a:lnSpc>
+              <a:spcBef>
+                <a:spcPts val="500"/>
+              </a:spcBef>
+              <a:buClr>
+                <a:schemeClr val="accent1"/>
+              </a:buClr>
+              <a:buSzPct val="100000"/>
+              <a:buFont typeface="Arial" panose="020B0604020202020204" pitchFamily="34" charset="0"/>
+              <a:buChar char="•"/>
+              <a:defRPr sz="1600" kern="1200">
+                <a:solidFill>
+                  <a:schemeClr val="tx1"/>
+                </a:solidFill>
+                <a:effectLst/>
+                <a:latin typeface="+mn-lt"/>
+                <a:ea typeface="+mn-ea"/>
+                <a:cs typeface="+mn-cs"/>
+              </a:defRPr>
+            </a:lvl3pPr>
+            <a:lvl4pPr marL="1600200" indent="-228600" algn="l" defTabSz="914400" rtl="0" eaLnBrk="1" latinLnBrk="0" hangingPunct="1">
+              <a:lnSpc>
+                <a:spcPct val="120000"/>
+              </a:lnSpc>
+              <a:spcBef>
+                <a:spcPts val="500"/>
+              </a:spcBef>
+              <a:buClr>
+                <a:schemeClr val="accent1"/>
+              </a:buClr>
+              <a:buSzPct val="100000"/>
+              <a:buFont typeface="Arial" panose="020B0604020202020204" pitchFamily="34" charset="0"/>
+              <a:buChar char="•"/>
+              <a:defRPr sz="1400" kern="1200" cap="none" baseline="0">
+                <a:solidFill>
+                  <a:schemeClr val="tx1"/>
+                </a:solidFill>
+                <a:effectLst/>
+                <a:latin typeface="+mn-lt"/>
+                <a:ea typeface="+mn-ea"/>
+                <a:cs typeface="+mn-cs"/>
+              </a:defRPr>
+            </a:lvl4pPr>
+            <a:lvl5pPr marL="2057400" indent="-228600" algn="l" defTabSz="914400" rtl="0" eaLnBrk="1" latinLnBrk="0" hangingPunct="1">
+              <a:lnSpc>
+                <a:spcPct val="120000"/>
+              </a:lnSpc>
+              <a:spcBef>
+                <a:spcPts val="500"/>
+              </a:spcBef>
+              <a:buClr>
+                <a:schemeClr val="accent1"/>
+              </a:buClr>
+              <a:buSzPct val="100000"/>
+              <a:buFont typeface="Arial" panose="020B0604020202020204" pitchFamily="34" charset="0"/>
+              <a:buChar char="•"/>
+              <a:defRPr sz="1200" kern="1200">
+                <a:solidFill>
+                  <a:schemeClr val="tx1"/>
+                </a:solidFill>
+                <a:effectLst/>
+                <a:latin typeface="+mn-lt"/>
+                <a:ea typeface="+mn-ea"/>
+                <a:cs typeface="+mn-cs"/>
+              </a:defRPr>
+            </a:lvl5pPr>
+            <a:lvl6pPr marL="2514600" indent="-228600" algn="l" defTabSz="914400" rtl="0" eaLnBrk="1" latinLnBrk="0" hangingPunct="1">
+              <a:lnSpc>
+                <a:spcPct val="120000"/>
+              </a:lnSpc>
+              <a:spcBef>
+                <a:spcPts val="500"/>
+              </a:spcBef>
+              <a:buClr>
+                <a:schemeClr val="accent1"/>
+              </a:buClr>
+              <a:buSzPct val="100000"/>
+              <a:buFont typeface="Arial" panose="020B0604020202020204" pitchFamily="34" charset="0"/>
+              <a:buChar char="•"/>
+              <a:defRPr sz="1200" kern="1200">
+                <a:solidFill>
+                  <a:schemeClr val="tx1"/>
+                </a:solidFill>
+                <a:effectLst/>
+                <a:latin typeface="+mn-lt"/>
+                <a:ea typeface="+mn-ea"/>
+                <a:cs typeface="+mn-cs"/>
+              </a:defRPr>
+            </a:lvl6pPr>
+            <a:lvl7pPr marL="2971800" indent="-228600" algn="l" defTabSz="914400" rtl="0" eaLnBrk="1" latinLnBrk="0" hangingPunct="1">
+              <a:lnSpc>
+                <a:spcPct val="120000"/>
+              </a:lnSpc>
+              <a:spcBef>
+                <a:spcPts val="500"/>
+              </a:spcBef>
+              <a:buClr>
+                <a:schemeClr val="accent1"/>
+              </a:buClr>
+              <a:buSzPct val="100000"/>
+              <a:buFont typeface="Arial" panose="020B0604020202020204" pitchFamily="34" charset="0"/>
+              <a:buChar char="•"/>
+              <a:defRPr sz="1200" kern="1200">
+                <a:solidFill>
+                  <a:schemeClr val="tx1"/>
+                </a:solidFill>
+                <a:effectLst/>
+                <a:latin typeface="+mn-lt"/>
+                <a:ea typeface="+mn-ea"/>
+                <a:cs typeface="+mn-cs"/>
+              </a:defRPr>
+            </a:lvl7pPr>
+            <a:lvl8pPr marL="3429000" indent="-228600" algn="l" defTabSz="914400" rtl="0" eaLnBrk="1" latinLnBrk="0" hangingPunct="1">
+              <a:lnSpc>
+                <a:spcPct val="120000"/>
+              </a:lnSpc>
+              <a:spcBef>
+                <a:spcPts val="500"/>
+              </a:spcBef>
+              <a:buClr>
+                <a:schemeClr val="accent1"/>
+              </a:buClr>
+              <a:buSzPct val="100000"/>
+              <a:buFont typeface="Arial" panose="020B0604020202020204" pitchFamily="34" charset="0"/>
+              <a:buChar char="•"/>
+              <a:defRPr sz="1200" kern="1200" baseline="0">
+                <a:solidFill>
+                  <a:schemeClr val="tx1"/>
+                </a:solidFill>
+                <a:effectLst/>
+                <a:latin typeface="+mn-lt"/>
+                <a:ea typeface="+mn-ea"/>
+                <a:cs typeface="+mn-cs"/>
+              </a:defRPr>
+            </a:lvl8pPr>
+            <a:lvl9pPr marL="3886200" indent="-228600" algn="l" defTabSz="914400" rtl="0" eaLnBrk="1" latinLnBrk="0" hangingPunct="1">
+              <a:lnSpc>
+                <a:spcPct val="120000"/>
+              </a:lnSpc>
+              <a:spcBef>
+                <a:spcPts val="500"/>
+              </a:spcBef>
+              <a:buClr>
+                <a:schemeClr val="accent1"/>
+              </a:buClr>
+              <a:buSzPct val="100000"/>
+              <a:buFont typeface="Arial" panose="020B0604020202020204" pitchFamily="34" charset="0"/>
+              <a:buChar char="•"/>
+              <a:defRPr sz="1200" kern="1200" baseline="0">
+                <a:solidFill>
+                  <a:schemeClr val="tx1"/>
+                </a:solidFill>
+                <a:effectLst/>
+                <a:latin typeface="+mn-lt"/>
+                <a:ea typeface="+mn-ea"/>
+                <a:cs typeface="+mn-cs"/>
+              </a:defRPr>
+            </a:lvl9pPr>
+          </a:lstStyle>
+          <a:p>
+            <a:pPr marL="0" indent="0" algn="ctr">
+              <a:buFont typeface="Arial" panose="020B0604020202020204" pitchFamily="34" charset="0"/>
+              <a:buNone/>
+            </a:pPr>
+            <a:r>
+              <a:rPr lang="en-US" sz="2200" dirty="0"/>
+              <a:t>Average Percent Error: 31.05%</a:t>
+            </a:r>
+          </a:p>
+          <a:p>
+            <a:pPr marL="0" indent="0" algn="ctr">
+              <a:buFont typeface="Arial" panose="020B0604020202020204" pitchFamily="34" charset="0"/>
+              <a:buNone/>
+            </a:pPr>
+            <a:endParaRPr lang="en-US" sz="4000" dirty="0"/>
+          </a:p>
+        </p:txBody>
+      </p:sp>
+    </p:spTree>
+    <p:extLst>
+      <p:ext uri="{BB962C8B-B14F-4D97-AF65-F5344CB8AC3E}">
+        <p14:creationId xmlns:p14="http://schemas.microsoft.com/office/powerpoint/2010/main" val="3151071892"/>
+      </p:ext>
+    </p:extLst>
+  </p:cSld>
+  <p:clrMapOvr>
+    <a:masterClrMapping/>
+  </p:clrMapOvr>
+</p:sld>
+</file>
+
+<file path=ppt/slides/slide11.xml><?xml version="1.0" encoding="utf-8"?>
+<p:sld xmlns:a="http://schemas.openxmlformats.org/drawingml/2006/main" xmlns:r="http://schemas.openxmlformats.org/officeDocument/2006/relationships" xmlns:p="http://schemas.openxmlformats.org/presentationml/2006/main">
+  <p:cSld>
+    <p:spTree>
+      <p:nvGrpSpPr>
+        <p:cNvPr id="1" name=""/>
+        <p:cNvGrpSpPr/>
+        <p:nvPr/>
+      </p:nvGrpSpPr>
+      <p:grpSpPr>
+        <a:xfrm>
+          <a:off x="0" y="0"/>
+          <a:ext cx="0" cy="0"/>
+          <a:chOff x="0" y="0"/>
+          <a:chExt cx="0" cy="0"/>
+        </a:xfrm>
+      </p:grpSpPr>
+      <p:sp>
+        <p:nvSpPr>
+          <p:cNvPr id="2" name="Title 1"/>
+          <p:cNvSpPr>
+            <a:spLocks noGrp="1"/>
+          </p:cNvSpPr>
+          <p:nvPr>
+            <p:ph type="title"/>
+          </p:nvPr>
+        </p:nvSpPr>
+        <p:spPr/>
+        <p:txBody>
+          <a:bodyPr/>
+          <a:lstStyle/>
+          <a:p>
+            <a:r>
+              <a:rPr lang="en-US" dirty="0"/>
+              <a:t>Possible Issues &amp; Ways it Could Be Fixed</a:t>
+            </a:r>
+          </a:p>
+        </p:txBody>
+      </p:sp>
+      <p:sp>
+        <p:nvSpPr>
+          <p:cNvPr id="3" name="Content Placeholder 2"/>
+          <p:cNvSpPr>
+            <a:spLocks noGrp="1"/>
+          </p:cNvSpPr>
+          <p:nvPr>
+            <p:ph idx="1"/>
+          </p:nvPr>
+        </p:nvSpPr>
+        <p:spPr/>
+        <p:txBody>
+          <a:bodyPr>
+            <a:normAutofit fontScale="92500"/>
+          </a:bodyPr>
+          <a:lstStyle/>
+          <a:p>
+            <a:r>
+              <a:rPr lang="en-US" dirty="0"/>
+              <a:t>Small Dataset</a:t>
+            </a:r>
+          </a:p>
+          <a:p>
+            <a:pPr lvl="1"/>
+            <a:r>
+              <a:rPr lang="en-US" dirty="0"/>
+              <a:t>The regression model is only based on 15 points of data (which isn’t a lot to work with). With more data, the model might’ve improved and showed better trends.</a:t>
+            </a:r>
+          </a:p>
+          <a:p>
+            <a:r>
+              <a:rPr lang="en-US" dirty="0"/>
+              <a:t>Advertising / Spam Tweets</a:t>
+            </a:r>
+          </a:p>
+          <a:p>
+            <a:pPr lvl="1"/>
+            <a:r>
+              <a:rPr lang="en-US" dirty="0"/>
+              <a:t>Could be skewing the sentiment scores. Hard to deal with without manually removing those tweets or creating a classifier to remove those tweets.</a:t>
+            </a:r>
+          </a:p>
+          <a:p>
+            <a:r>
+              <a:rPr lang="en-US" dirty="0"/>
+              <a:t>The Data Itself</a:t>
+            </a:r>
+          </a:p>
+          <a:p>
+            <a:pPr lvl="1"/>
+            <a:r>
+              <a:rPr lang="en-US" dirty="0"/>
+              <a:t>The T-Scores for all of the variables were non-significant. If someone wanted to predict Metacritic scores and the two steps above didn’t help, the next step might be to look at other data sources.</a:t>
+            </a:r>
+          </a:p>
+        </p:txBody>
+      </p:sp>
+    </p:spTree>
+    <p:extLst>
+      <p:ext uri="{BB962C8B-B14F-4D97-AF65-F5344CB8AC3E}">
+        <p14:creationId xmlns:p14="http://schemas.microsoft.com/office/powerpoint/2010/main" val="2972031166"/>
+      </p:ext>
+    </p:extLst>
+  </p:cSld>
+  <p:clrMapOvr>
+    <a:masterClrMapping/>
+  </p:clrMapOvr>
+</p:sld>
+</file>
+
+<file path=ppt/slides/slide12.xml><?xml version="1.0" encoding="utf-8"?>
+<p:sld xmlns:a="http://schemas.openxmlformats.org/drawingml/2006/main" xmlns:r="http://schemas.openxmlformats.org/officeDocument/2006/relationships" xmlns:p="http://schemas.openxmlformats.org/presentationml/2006/main">
+  <p:cSld>
+    <p:spTree>
+      <p:nvGrpSpPr>
+        <p:cNvPr id="1" name=""/>
+        <p:cNvGrpSpPr/>
+        <p:nvPr/>
+      </p:nvGrpSpPr>
+      <p:grpSpPr>
+        <a:xfrm>
+          <a:off x="0" y="0"/>
+          <a:ext cx="0" cy="0"/>
+          <a:chOff x="0" y="0"/>
+          <a:chExt cx="0" cy="0"/>
+        </a:xfrm>
+      </p:grpSpPr>
+      <p:sp>
+        <p:nvSpPr>
+          <p:cNvPr id="2" name="Title 1"/>
+          <p:cNvSpPr>
+            <a:spLocks noGrp="1"/>
+          </p:cNvSpPr>
+          <p:nvPr>
+            <p:ph type="title"/>
+          </p:nvPr>
+        </p:nvSpPr>
+        <p:spPr/>
+        <p:txBody>
+          <a:bodyPr/>
+          <a:lstStyle/>
+          <a:p>
+            <a:r>
+              <a:rPr lang="en-US" dirty="0"/>
+              <a:t>In Conclusion</a:t>
+            </a:r>
+          </a:p>
+        </p:txBody>
+      </p:sp>
+      <p:sp>
+        <p:nvSpPr>
+          <p:cNvPr id="3" name="Content Placeholder 2"/>
+          <p:cNvSpPr>
+            <a:spLocks noGrp="1"/>
+          </p:cNvSpPr>
+          <p:nvPr>
+            <p:ph idx="1"/>
+          </p:nvPr>
+        </p:nvSpPr>
+        <p:spPr/>
+        <p:txBody>
+          <a:bodyPr/>
+          <a:lstStyle/>
+          <a:p>
+            <a:r>
+              <a:rPr lang="en-US" dirty="0"/>
+              <a:t>The regression model ended up being inaccurate but there are a few steps that could be taken in order to possibly improve it.</a:t>
+            </a:r>
+          </a:p>
+          <a:p>
+            <a:r>
+              <a:rPr lang="en-US" dirty="0"/>
+              <a:t>However, we still believe our project was a success because we got a pretty neat user interface and learned a lot working on this project</a:t>
+            </a:r>
+          </a:p>
+        </p:txBody>
+      </p:sp>
+    </p:spTree>
+    <p:extLst>
+      <p:ext uri="{BB962C8B-B14F-4D97-AF65-F5344CB8AC3E}">
+        <p14:creationId xmlns:p14="http://schemas.microsoft.com/office/powerpoint/2010/main" val="2508153842"/>
+      </p:ext>
+    </p:extLst>
+  </p:cSld>
+  <p:clrMapOvr>
+    <a:masterClrMapping/>
+  </p:clrMapOvr>
+</p:sld>
+</file>
+
+<file path=ppt/slides/slide13.xml><?xml version="1.0" encoding="utf-8"?>
+<p:sld xmlns:a="http://schemas.openxmlformats.org/drawingml/2006/main" xmlns:r="http://schemas.openxmlformats.org/officeDocument/2006/relationships" xmlns:p="http://schemas.openxmlformats.org/presentationml/2006/main">
+  <p:cSld>
+    <p:spTree>
+      <p:nvGrpSpPr>
+        <p:cNvPr id="1" name=""/>
+        <p:cNvGrpSpPr/>
+        <p:nvPr/>
+      </p:nvGrpSpPr>
+      <p:grpSpPr>
+        <a:xfrm>
+          <a:off x="0" y="0"/>
+          <a:ext cx="0" cy="0"/>
+          <a:chOff x="0" y="0"/>
+          <a:chExt cx="0" cy="0"/>
+        </a:xfrm>
+      </p:grpSpPr>
+      <p:sp>
+        <p:nvSpPr>
+          <p:cNvPr id="4" name="Title 3"/>
+          <p:cNvSpPr>
+            <a:spLocks noGrp="1"/>
+          </p:cNvSpPr>
+          <p:nvPr>
+            <p:ph type="title"/>
+          </p:nvPr>
+        </p:nvSpPr>
+        <p:spPr/>
+        <p:txBody>
+          <a:bodyPr/>
+          <a:lstStyle/>
+          <a:p>
+            <a:r>
+              <a:rPr lang="en-US" dirty="0"/>
+              <a:t>QUESTIONS?</a:t>
+            </a:r>
+          </a:p>
+        </p:txBody>
+      </p:sp>
+    </p:spTree>
+    <p:extLst>
+      <p:ext uri="{BB962C8B-B14F-4D97-AF65-F5344CB8AC3E}">
+        <p14:creationId xmlns:p14="http://schemas.microsoft.com/office/powerpoint/2010/main" val="2406187761"/>
       </p:ext>
     </p:extLst>
   </p:cSld>
@@ -3740,7 +5278,7 @@
           <a:p>
             <a:r>
               <a:rPr lang="en-US" dirty="0"/>
-              <a:t>What is the Project IDEA</a:t>
+              <a:t>Why the Project is Awesome</a:t>
             </a:r>
           </a:p>
         </p:txBody>
@@ -3758,7 +5296,7 @@
         <p:spPr>
           <a:xfrm>
             <a:off x="1451579" y="2015734"/>
-            <a:ext cx="5622284" cy="3450613"/>
+            <a:ext cx="5622284" cy="4029466"/>
           </a:xfrm>
         </p:spPr>
         <p:txBody>
@@ -3769,19 +5307,19 @@
           <a:p>
             <a:r>
               <a:rPr lang="en-US" dirty="0"/>
-              <a:t>Metacritic is a review aggregate site</a:t>
-            </a:r>
-          </a:p>
-          <a:p>
-            <a:r>
-              <a:rPr lang="en-US" dirty="0"/>
-              <a:t>We want to use Text / Natural Language Processing on Twitter Data in order to predict a product’s Metacritic score before it is released</a:t>
-            </a:r>
-          </a:p>
-          <a:p>
-            <a:r>
-              <a:rPr lang="en-US" dirty="0"/>
-              <a:t>We would use topics taught in class (such as sentiment analysis) and also some outside techniques in order to accomplish this.</a:t>
+              <a:t>Metacritic is a review aggregate site that takes critics’ reviews of entertainment products and gives that product a score from 1-100 based on the reviews</a:t>
+            </a:r>
+          </a:p>
+          <a:p>
+            <a:r>
+              <a:rPr lang="en-US" dirty="0"/>
+              <a:t>We wanted to use Twitter to predict the Metacritic score of a product before it was released</a:t>
+            </a:r>
+          </a:p>
+          <a:p>
+            <a:r>
+              <a:rPr lang="en-US" dirty="0"/>
+              <a:t>We also wanted create a UI to see how people were reacting to a product in real time.</a:t>
             </a:r>
           </a:p>
         </p:txBody>
@@ -3833,7 +5371,7 @@
           <a:p>
             <a:r>
               <a:rPr lang="en-US" dirty="0"/>
-              <a:t>Why is this useful To Humans</a:t>
+              <a:t>Usefulness of Knowing a Metacritic Score before a product’s release</a:t>
             </a:r>
           </a:p>
         </p:txBody>
@@ -3990,8 +5528,8 @@
         </p:nvSpPr>
         <p:spPr>
           <a:xfrm>
-            <a:off x="5432570" y="2015734"/>
-            <a:ext cx="5622284" cy="3450613"/>
+            <a:off x="5130800" y="2015734"/>
+            <a:ext cx="5924054" cy="3450613"/>
           </a:xfrm>
         </p:spPr>
         <p:txBody>
@@ -4002,24 +5540,42 @@
           <a:p>
             <a:r>
               <a:rPr lang="en-US" dirty="0"/>
-              <a:t>Data will be collected using the Twitter API</a:t>
+              <a:t>Our system’s input was text (Twitter Data)</a:t>
+            </a:r>
+          </a:p>
+          <a:p>
+            <a:r>
+              <a:rPr lang="en-US" dirty="0"/>
+              <a:t>We used the Twitter’s Search API (using a Python library called Tweepy) to gather tweets and save them to csv files based on product</a:t>
             </a:r>
           </a:p>
           <a:p>
             <a:pPr lvl="1"/>
             <a:r>
               <a:rPr lang="en-US" dirty="0"/>
-              <a:t>Likely this will be done using the Tweepy Library in Python</a:t>
-            </a:r>
-          </a:p>
-          <a:p>
-            <a:r>
-              <a:rPr lang="en-US" dirty="0"/>
-              <a:t>Data will be collected for a project a week before it is going to be released for a set amount of tweets (likely 10,000)</a:t>
-            </a:r>
-          </a:p>
-          <a:p>
-            <a:endParaRPr lang="en-US" dirty="0"/>
+              <a:t>Only Problem is that Twitter’s Search API is restrictive</a:t>
+            </a:r>
+          </a:p>
+          <a:p>
+            <a:pPr lvl="1"/>
+            <a:r>
+              <a:rPr lang="en-US" dirty="0"/>
+              <a:t>Can only look 7 days in past for tweets</a:t>
+            </a:r>
+          </a:p>
+          <a:p>
+            <a:pPr lvl="1"/>
+            <a:r>
+              <a:rPr lang="en-US" dirty="0"/>
+              <a:t>Ended up with 20 datasets of 1,000 tweets</a:t>
+            </a:r>
+          </a:p>
+          <a:p>
+            <a:pPr lvl="1"/>
+            <a:r>
+              <a:rPr lang="en-US" dirty="0"/>
+              <a:t>15 were used for training and 5 were used for testing</a:t>
+            </a:r>
           </a:p>
         </p:txBody>
       </p:sp>
@@ -4070,7 +5626,7 @@
           <a:p>
             <a:r>
               <a:rPr lang="en-US" dirty="0"/>
-              <a:t>Approach</a:t>
+              <a:t>Other Data Collection</a:t>
             </a:r>
           </a:p>
         </p:txBody>
@@ -4087,69 +5643,51 @@
         </p:nvSpPr>
         <p:spPr/>
         <p:txBody>
-          <a:bodyPr>
-            <a:normAutofit fontScale="92500" lnSpcReduction="10000"/>
-          </a:bodyPr>
-          <a:lstStyle/>
-          <a:p>
-            <a:r>
-              <a:rPr lang="en-US" dirty="0"/>
-              <a:t>Use linear regression in order to get a function to output a final score</a:t>
-            </a:r>
-          </a:p>
-          <a:p>
-            <a:r>
-              <a:rPr lang="en-US" dirty="0"/>
-              <a:t>When trying to find the best model, we will always include some sort of NLP value in the function.</a:t>
-            </a:r>
-          </a:p>
-          <a:p>
-            <a:r>
-              <a:rPr lang="en-US" dirty="0"/>
-              <a:t>Track factors of product such as:</a:t>
+          <a:bodyPr/>
+          <a:lstStyle/>
+          <a:p>
+            <a:r>
+              <a:rPr lang="en-US" dirty="0"/>
+              <a:t>Sentiment Dictionary</a:t>
             </a:r>
           </a:p>
           <a:p>
             <a:pPr lvl="1"/>
             <a:r>
               <a:rPr lang="en-US" dirty="0"/>
-              <a:t>Sentiment Analysis Scores</a:t>
+              <a:t>Used dictionary created by Finn Arup Nielsen from the web</a:t>
             </a:r>
           </a:p>
           <a:p>
             <a:pPr lvl="1"/>
             <a:r>
               <a:rPr lang="en-US" dirty="0"/>
-              <a:t>Modified Version of Document Vectors </a:t>
+              <a:t>Rated words and phrases from 5 (being very positive) to -5 (being very negative)</a:t>
+            </a:r>
+          </a:p>
+          <a:p>
+            <a:r>
+              <a:rPr lang="en-US" dirty="0"/>
+              <a:t>Metacritic Scores</a:t>
             </a:r>
           </a:p>
           <a:p>
             <a:pPr lvl="1"/>
             <a:r>
               <a:rPr lang="en-US" dirty="0"/>
-              <a:t>Retweets</a:t>
+              <a:t>Collected manually and saved to a text file</a:t>
             </a:r>
           </a:p>
           <a:p>
             <a:pPr lvl="1"/>
-            <a:r>
-              <a:rPr lang="en-US" dirty="0"/>
-              <a:t>Likes</a:t>
-            </a:r>
-          </a:p>
-          <a:p>
-            <a:pPr lvl="1"/>
-            <a:r>
-              <a:rPr lang="en-US" dirty="0"/>
-              <a:t>etc.</a:t>
-            </a:r>
+            <a:endParaRPr lang="en-US" dirty="0"/>
           </a:p>
         </p:txBody>
       </p:sp>
     </p:spTree>
     <p:extLst>
       <p:ext uri="{BB962C8B-B14F-4D97-AF65-F5344CB8AC3E}">
-        <p14:creationId xmlns:p14="http://schemas.microsoft.com/office/powerpoint/2010/main" val="1771738529"/>
+        <p14:creationId xmlns:p14="http://schemas.microsoft.com/office/powerpoint/2010/main" val="1807776477"/>
       </p:ext>
     </p:extLst>
   </p:cSld>
@@ -4193,7 +5731,7 @@
           <a:p>
             <a:r>
               <a:rPr lang="en-US" dirty="0"/>
-              <a:t>Training and Testing</a:t>
+              <a:t>Feature Extraction Process</a:t>
             </a:r>
           </a:p>
         </p:txBody>
@@ -4215,20 +5753,56 @@
           <a:p>
             <a:r>
               <a:rPr lang="en-US" dirty="0"/>
-              <a:t>We will try to get a set of at least 50 different products (probably more) on Metacritic to serve as the training data. This data will be labeled with the Metacritic Scores</a:t>
-            </a:r>
-          </a:p>
-          <a:p>
-            <a:r>
-              <a:rPr lang="en-US" dirty="0"/>
-              <a:t>We will also have a test set of data we will use in order to see how accurate the model is based on how far away the predicted value is to the true value</a:t>
+              <a:t>Each tweet was set to all lower case and had the following removed during analysis:</a:t>
             </a:r>
           </a:p>
           <a:p>
             <a:pPr lvl="1"/>
             <a:r>
               <a:rPr lang="en-US" dirty="0"/>
-              <a:t>Test data will help us to determine which features to keep in the linear regression model and which to throw out</a:t>
+              <a:t>Stop Words</a:t>
+            </a:r>
+          </a:p>
+          <a:p>
+            <a:pPr lvl="1"/>
+            <a:r>
+              <a:rPr lang="en-US" dirty="0"/>
+              <a:t>Usernames</a:t>
+            </a:r>
+          </a:p>
+          <a:p>
+            <a:pPr lvl="1"/>
+            <a:r>
+              <a:rPr lang="en-US" dirty="0"/>
+              <a:t>Links</a:t>
+            </a:r>
+          </a:p>
+          <a:p>
+            <a:pPr lvl="1"/>
+            <a:r>
+              <a:rPr lang="en-US" dirty="0"/>
+              <a:t>“</a:t>
+            </a:r>
+            <a:r>
+              <a:rPr lang="en-US" dirty="0" err="1"/>
+              <a:t>rt</a:t>
+            </a:r>
+            <a:r>
+              <a:rPr lang="en-US" dirty="0"/>
+              <a:t>” Strings</a:t>
+            </a:r>
+          </a:p>
+          <a:p>
+            <a:pPr lvl="1"/>
+            <a:r>
+              <a:rPr lang="en-US" dirty="0"/>
+              <a:t>Topic Words (So if you searched “Forest Gump”, “Forest” and “Gump” was removed)</a:t>
+            </a:r>
+          </a:p>
+          <a:p>
+            <a:r>
+              <a:rPr lang="en-US" dirty="0"/>
+              <a:t>Sentiment Analysis was then performed and the tweet was checked for uniqueness</a:t>
             </a:r>
           </a:p>
         </p:txBody>
@@ -4265,6 +5839,177 @@
       </p:grpSpPr>
       <p:sp>
         <p:nvSpPr>
+          <p:cNvPr id="4" name="Title 3"/>
+          <p:cNvSpPr>
+            <a:spLocks noGrp="1"/>
+          </p:cNvSpPr>
+          <p:nvPr>
+            <p:ph type="title"/>
+          </p:nvPr>
+        </p:nvSpPr>
+        <p:spPr>
+          <a:xfrm>
+            <a:off x="1449217" y="1323833"/>
+            <a:ext cx="9605635" cy="540361"/>
+          </a:xfrm>
+        </p:spPr>
+        <p:txBody>
+          <a:bodyPr/>
+          <a:lstStyle/>
+          <a:p>
+            <a:pPr algn="ctr"/>
+            <a:r>
+              <a:rPr lang="en-US" dirty="0"/>
+              <a:t>Chosen Features            Not Chosen Features</a:t>
+            </a:r>
+          </a:p>
+        </p:txBody>
+      </p:sp>
+      <p:sp>
+        <p:nvSpPr>
+          <p:cNvPr id="5" name="Content Placeholder 4"/>
+          <p:cNvSpPr>
+            <a:spLocks noGrp="1"/>
+          </p:cNvSpPr>
+          <p:nvPr>
+            <p:ph sz="half" idx="1"/>
+          </p:nvPr>
+        </p:nvSpPr>
+        <p:spPr>
+          <a:ln>
+            <a:solidFill>
+              <a:schemeClr val="accent1"/>
+            </a:solidFill>
+          </a:ln>
+        </p:spPr>
+        <p:txBody>
+          <a:bodyPr/>
+          <a:lstStyle/>
+          <a:p>
+            <a:r>
+              <a:rPr lang="en-US" dirty="0"/>
+              <a:t>Average Positive Sentiment Score for Topic</a:t>
+            </a:r>
+          </a:p>
+          <a:p>
+            <a:pPr lvl="1"/>
+            <a:r>
+              <a:rPr lang="en-US" dirty="0"/>
+              <a:t>Total Positive Sentiment / # Tweets</a:t>
+            </a:r>
+          </a:p>
+          <a:p>
+            <a:r>
+              <a:rPr lang="en-US" dirty="0"/>
+              <a:t>Average Negative Sentiment Score for Topic</a:t>
+            </a:r>
+          </a:p>
+          <a:p>
+            <a:pPr lvl="1"/>
+            <a:r>
+              <a:rPr lang="en-US" dirty="0"/>
+              <a:t>Total Negative Sentiment / # Tweets</a:t>
+            </a:r>
+          </a:p>
+          <a:p>
+            <a:r>
+              <a:rPr lang="en-US" dirty="0"/>
+              <a:t>Uniqueness</a:t>
+            </a:r>
+          </a:p>
+          <a:p>
+            <a:pPr lvl="1"/>
+            <a:r>
+              <a:rPr lang="en-US" dirty="0"/>
+              <a:t>Unique Count of Tweets / # Tweets</a:t>
+            </a:r>
+          </a:p>
+        </p:txBody>
+      </p:sp>
+      <p:sp>
+        <p:nvSpPr>
+          <p:cNvPr id="6" name="Content Placeholder 5"/>
+          <p:cNvSpPr>
+            <a:spLocks noGrp="1"/>
+          </p:cNvSpPr>
+          <p:nvPr>
+            <p:ph sz="half" idx="2"/>
+          </p:nvPr>
+        </p:nvSpPr>
+        <p:spPr>
+          <a:xfrm>
+            <a:off x="6409700" y="2017953"/>
+            <a:ext cx="4645152" cy="3441520"/>
+          </a:xfrm>
+          <a:ln>
+            <a:solidFill>
+              <a:schemeClr val="accent1"/>
+            </a:solidFill>
+          </a:ln>
+        </p:spPr>
+        <p:txBody>
+          <a:bodyPr/>
+          <a:lstStyle/>
+          <a:p>
+            <a:r>
+              <a:rPr lang="en-US" dirty="0"/>
+              <a:t>Individual Word Count</a:t>
+            </a:r>
+          </a:p>
+          <a:p>
+            <a:pPr lvl="1"/>
+            <a:r>
+              <a:rPr lang="en-US" dirty="0"/>
+              <a:t>Too easy to skew for a specific topic and possibly spam </a:t>
+            </a:r>
+          </a:p>
+          <a:p>
+            <a:r>
+              <a:rPr lang="en-US" dirty="0"/>
+              <a:t>Average Unique Positive and Negative Sentiment</a:t>
+            </a:r>
+          </a:p>
+          <a:p>
+            <a:pPr lvl="1"/>
+            <a:r>
+              <a:rPr lang="en-US" dirty="0"/>
+              <a:t>T-test scores weren’t very good (They weren’t really good for any of the variables but we’ll get to that later)</a:t>
+            </a:r>
+          </a:p>
+        </p:txBody>
+      </p:sp>
+    </p:spTree>
+    <p:extLst>
+      <p:ext uri="{BB962C8B-B14F-4D97-AF65-F5344CB8AC3E}">
+        <p14:creationId xmlns:p14="http://schemas.microsoft.com/office/powerpoint/2010/main" val="2625556361"/>
+      </p:ext>
+    </p:extLst>
+  </p:cSld>
+  <p:clrMapOvr>
+    <a:masterClrMapping/>
+  </p:clrMapOvr>
+</p:sld>
+</file>
+
+<file path=ppt/slides/slide8.xml><?xml version="1.0" encoding="utf-8"?>
+<p:sld xmlns:a="http://schemas.openxmlformats.org/drawingml/2006/main" xmlns:r="http://schemas.openxmlformats.org/officeDocument/2006/relationships" xmlns:p="http://schemas.openxmlformats.org/presentationml/2006/main">
+  <p:cSld>
+    <p:spTree>
+      <p:nvGrpSpPr>
+        <p:cNvPr id="1" name=""/>
+        <p:cNvGrpSpPr/>
+        <p:nvPr/>
+      </p:nvGrpSpPr>
+      <p:grpSpPr>
+        <a:xfrm>
+          <a:off x="0" y="0"/>
+          <a:ext cx="0" cy="0"/>
+          <a:chOff x="0" y="0"/>
+          <a:chExt cx="0" cy="0"/>
+        </a:xfrm>
+      </p:grpSpPr>
+      <p:sp>
+        <p:nvSpPr>
           <p:cNvPr id="2" name="Title 1"/>
           <p:cNvSpPr>
             <a:spLocks noGrp="1"/>
@@ -4280,7 +6025,7 @@
           <a:p>
             <a:r>
               <a:rPr lang="en-US" dirty="0"/>
-              <a:t>Ultimate Final Product</a:t>
+              <a:t>Final Model</a:t>
             </a:r>
           </a:p>
         </p:txBody>
@@ -4295,15 +6040,296 @@
             <p:ph idx="1"/>
           </p:nvPr>
         </p:nvSpPr>
-        <p:spPr/>
-        <p:txBody>
-          <a:bodyPr/>
-          <a:lstStyle/>
-          <a:p>
-            <a:r>
-              <a:rPr lang="en-US" dirty="0"/>
-              <a:t>Final goal would be to create simple user interface where you could ask to predict a certain products Metacritic score, and get an output with data, charts, and the predicted score.</a:t>
-            </a:r>
+        <p:spPr>
+          <a:xfrm>
+            <a:off x="986949" y="2286000"/>
+            <a:ext cx="10532534" cy="1588612"/>
+          </a:xfrm>
+        </p:spPr>
+        <p:txBody>
+          <a:bodyPr>
+            <a:normAutofit/>
+          </a:bodyPr>
+          <a:lstStyle/>
+          <a:p>
+            <a:pPr marL="0" indent="0">
+              <a:buNone/>
+            </a:pPr>
+            <a:r>
+              <a:rPr lang="en-US" sz="4000" dirty="0"/>
+              <a:t>Predicted Score = 65.6814 + 18.9509 (</a:t>
+            </a:r>
+            <a:r>
+              <a:rPr lang="en-US" sz="4000" dirty="0" err="1"/>
+              <a:t>avgNeg</a:t>
+            </a:r>
+            <a:r>
+              <a:rPr lang="en-US" sz="4000" dirty="0"/>
+              <a:t>) + 0.5334(</a:t>
+            </a:r>
+            <a:r>
+              <a:rPr lang="en-US" sz="4000" dirty="0" err="1"/>
+              <a:t>avgPos</a:t>
+            </a:r>
+            <a:r>
+              <a:rPr lang="en-US" sz="4000" dirty="0"/>
+              <a:t>) – 3.2850 (unique)</a:t>
+            </a:r>
+          </a:p>
+          <a:p>
+            <a:pPr marL="0" indent="0">
+              <a:buNone/>
+            </a:pPr>
+            <a:endParaRPr lang="en-US" sz="4000" dirty="0"/>
+          </a:p>
+        </p:txBody>
+      </p:sp>
+      <p:sp>
+        <p:nvSpPr>
+          <p:cNvPr id="4" name="Content Placeholder 2"/>
+          <p:cNvSpPr txBox="1">
+            <a:spLocks/>
+          </p:cNvSpPr>
+          <p:nvPr/>
+        </p:nvSpPr>
+        <p:spPr>
+          <a:xfrm>
+            <a:off x="986949" y="4306858"/>
+            <a:ext cx="10532534" cy="1388765"/>
+          </a:xfrm>
+          <a:prstGeom prst="rect">
+            <a:avLst/>
+          </a:prstGeom>
+        </p:spPr>
+        <p:txBody>
+          <a:bodyPr vert="horz" lIns="91440" tIns="45720" rIns="91440" bIns="45720" rtlCol="0" anchor="t">
+            <a:normAutofit fontScale="92500" lnSpcReduction="10000"/>
+          </a:bodyPr>
+          <a:lstStyle>
+            <a:lvl1pPr marL="228600" indent="-228600" algn="l" defTabSz="914400" rtl="0" eaLnBrk="1" latinLnBrk="0" hangingPunct="1">
+              <a:lnSpc>
+                <a:spcPct val="120000"/>
+              </a:lnSpc>
+              <a:spcBef>
+                <a:spcPts val="1000"/>
+              </a:spcBef>
+              <a:buClr>
+                <a:schemeClr val="accent1"/>
+              </a:buClr>
+              <a:buSzPct val="100000"/>
+              <a:buFont typeface="Arial" panose="020B0604020202020204" pitchFamily="34" charset="0"/>
+              <a:buChar char="•"/>
+              <a:defRPr sz="2000" kern="1200">
+                <a:solidFill>
+                  <a:schemeClr val="tx1"/>
+                </a:solidFill>
+                <a:effectLst/>
+                <a:latin typeface="+mn-lt"/>
+                <a:ea typeface="+mn-ea"/>
+                <a:cs typeface="+mn-cs"/>
+              </a:defRPr>
+            </a:lvl1pPr>
+            <a:lvl2pPr marL="685800" indent="-228600" algn="l" defTabSz="914400" rtl="0" eaLnBrk="1" latinLnBrk="0" hangingPunct="1">
+              <a:lnSpc>
+                <a:spcPct val="120000"/>
+              </a:lnSpc>
+              <a:spcBef>
+                <a:spcPts val="500"/>
+              </a:spcBef>
+              <a:buClr>
+                <a:schemeClr val="accent1"/>
+              </a:buClr>
+              <a:buSzPct val="100000"/>
+              <a:buFont typeface="Arial" panose="020B0604020202020204" pitchFamily="34" charset="0"/>
+              <a:buChar char="•"/>
+              <a:defRPr sz="1800" kern="1200" cap="none" baseline="0">
+                <a:solidFill>
+                  <a:schemeClr val="tx1"/>
+                </a:solidFill>
+                <a:effectLst/>
+                <a:latin typeface="+mn-lt"/>
+                <a:ea typeface="+mn-ea"/>
+                <a:cs typeface="+mn-cs"/>
+              </a:defRPr>
+            </a:lvl2pPr>
+            <a:lvl3pPr marL="1143000" indent="-228600" algn="l" defTabSz="914400" rtl="0" eaLnBrk="1" latinLnBrk="0" hangingPunct="1">
+              <a:lnSpc>
+                <a:spcPct val="120000"/>
+              </a:lnSpc>
+              <a:spcBef>
+                <a:spcPts val="500"/>
+              </a:spcBef>
+              <a:buClr>
+                <a:schemeClr val="accent1"/>
+              </a:buClr>
+              <a:buSzPct val="100000"/>
+              <a:buFont typeface="Arial" panose="020B0604020202020204" pitchFamily="34" charset="0"/>
+              <a:buChar char="•"/>
+              <a:defRPr sz="1600" kern="1200">
+                <a:solidFill>
+                  <a:schemeClr val="tx1"/>
+                </a:solidFill>
+                <a:effectLst/>
+                <a:latin typeface="+mn-lt"/>
+                <a:ea typeface="+mn-ea"/>
+                <a:cs typeface="+mn-cs"/>
+              </a:defRPr>
+            </a:lvl3pPr>
+            <a:lvl4pPr marL="1600200" indent="-228600" algn="l" defTabSz="914400" rtl="0" eaLnBrk="1" latinLnBrk="0" hangingPunct="1">
+              <a:lnSpc>
+                <a:spcPct val="120000"/>
+              </a:lnSpc>
+              <a:spcBef>
+                <a:spcPts val="500"/>
+              </a:spcBef>
+              <a:buClr>
+                <a:schemeClr val="accent1"/>
+              </a:buClr>
+              <a:buSzPct val="100000"/>
+              <a:buFont typeface="Arial" panose="020B0604020202020204" pitchFamily="34" charset="0"/>
+              <a:buChar char="•"/>
+              <a:defRPr sz="1400" kern="1200" cap="none" baseline="0">
+                <a:solidFill>
+                  <a:schemeClr val="tx1"/>
+                </a:solidFill>
+                <a:effectLst/>
+                <a:latin typeface="+mn-lt"/>
+                <a:ea typeface="+mn-ea"/>
+                <a:cs typeface="+mn-cs"/>
+              </a:defRPr>
+            </a:lvl4pPr>
+            <a:lvl5pPr marL="2057400" indent="-228600" algn="l" defTabSz="914400" rtl="0" eaLnBrk="1" latinLnBrk="0" hangingPunct="1">
+              <a:lnSpc>
+                <a:spcPct val="120000"/>
+              </a:lnSpc>
+              <a:spcBef>
+                <a:spcPts val="500"/>
+              </a:spcBef>
+              <a:buClr>
+                <a:schemeClr val="accent1"/>
+              </a:buClr>
+              <a:buSzPct val="100000"/>
+              <a:buFont typeface="Arial" panose="020B0604020202020204" pitchFamily="34" charset="0"/>
+              <a:buChar char="•"/>
+              <a:defRPr sz="1200" kern="1200">
+                <a:solidFill>
+                  <a:schemeClr val="tx1"/>
+                </a:solidFill>
+                <a:effectLst/>
+                <a:latin typeface="+mn-lt"/>
+                <a:ea typeface="+mn-ea"/>
+                <a:cs typeface="+mn-cs"/>
+              </a:defRPr>
+            </a:lvl5pPr>
+            <a:lvl6pPr marL="2514600" indent="-228600" algn="l" defTabSz="914400" rtl="0" eaLnBrk="1" latinLnBrk="0" hangingPunct="1">
+              <a:lnSpc>
+                <a:spcPct val="120000"/>
+              </a:lnSpc>
+              <a:spcBef>
+                <a:spcPts val="500"/>
+              </a:spcBef>
+              <a:buClr>
+                <a:schemeClr val="accent1"/>
+              </a:buClr>
+              <a:buSzPct val="100000"/>
+              <a:buFont typeface="Arial" panose="020B0604020202020204" pitchFamily="34" charset="0"/>
+              <a:buChar char="•"/>
+              <a:defRPr sz="1200" kern="1200">
+                <a:solidFill>
+                  <a:schemeClr val="tx1"/>
+                </a:solidFill>
+                <a:effectLst/>
+                <a:latin typeface="+mn-lt"/>
+                <a:ea typeface="+mn-ea"/>
+                <a:cs typeface="+mn-cs"/>
+              </a:defRPr>
+            </a:lvl6pPr>
+            <a:lvl7pPr marL="2971800" indent="-228600" algn="l" defTabSz="914400" rtl="0" eaLnBrk="1" latinLnBrk="0" hangingPunct="1">
+              <a:lnSpc>
+                <a:spcPct val="120000"/>
+              </a:lnSpc>
+              <a:spcBef>
+                <a:spcPts val="500"/>
+              </a:spcBef>
+              <a:buClr>
+                <a:schemeClr val="accent1"/>
+              </a:buClr>
+              <a:buSzPct val="100000"/>
+              <a:buFont typeface="Arial" panose="020B0604020202020204" pitchFamily="34" charset="0"/>
+              <a:buChar char="•"/>
+              <a:defRPr sz="1200" kern="1200">
+                <a:solidFill>
+                  <a:schemeClr val="tx1"/>
+                </a:solidFill>
+                <a:effectLst/>
+                <a:latin typeface="+mn-lt"/>
+                <a:ea typeface="+mn-ea"/>
+                <a:cs typeface="+mn-cs"/>
+              </a:defRPr>
+            </a:lvl7pPr>
+            <a:lvl8pPr marL="3429000" indent="-228600" algn="l" defTabSz="914400" rtl="0" eaLnBrk="1" latinLnBrk="0" hangingPunct="1">
+              <a:lnSpc>
+                <a:spcPct val="120000"/>
+              </a:lnSpc>
+              <a:spcBef>
+                <a:spcPts val="500"/>
+              </a:spcBef>
+              <a:buClr>
+                <a:schemeClr val="accent1"/>
+              </a:buClr>
+              <a:buSzPct val="100000"/>
+              <a:buFont typeface="Arial" panose="020B0604020202020204" pitchFamily="34" charset="0"/>
+              <a:buChar char="•"/>
+              <a:defRPr sz="1200" kern="1200" baseline="0">
+                <a:solidFill>
+                  <a:schemeClr val="tx1"/>
+                </a:solidFill>
+                <a:effectLst/>
+                <a:latin typeface="+mn-lt"/>
+                <a:ea typeface="+mn-ea"/>
+                <a:cs typeface="+mn-cs"/>
+              </a:defRPr>
+            </a:lvl8pPr>
+            <a:lvl9pPr marL="3886200" indent="-228600" algn="l" defTabSz="914400" rtl="0" eaLnBrk="1" latinLnBrk="0" hangingPunct="1">
+              <a:lnSpc>
+                <a:spcPct val="120000"/>
+              </a:lnSpc>
+              <a:spcBef>
+                <a:spcPts val="500"/>
+              </a:spcBef>
+              <a:buClr>
+                <a:schemeClr val="accent1"/>
+              </a:buClr>
+              <a:buSzPct val="100000"/>
+              <a:buFont typeface="Arial" panose="020B0604020202020204" pitchFamily="34" charset="0"/>
+              <a:buChar char="•"/>
+              <a:defRPr sz="1200" kern="1200" baseline="0">
+                <a:solidFill>
+                  <a:schemeClr val="tx1"/>
+                </a:solidFill>
+                <a:effectLst/>
+                <a:latin typeface="+mn-lt"/>
+                <a:ea typeface="+mn-ea"/>
+                <a:cs typeface="+mn-cs"/>
+              </a:defRPr>
+            </a:lvl9pPr>
+          </a:lstStyle>
+          <a:p>
+            <a:pPr marL="0" indent="0">
+              <a:buFont typeface="Arial" panose="020B0604020202020204" pitchFamily="34" charset="0"/>
+              <a:buNone/>
+            </a:pPr>
+            <a:r>
+              <a:rPr lang="en-US" sz="4000" dirty="0"/>
+              <a:t>We’ll talk more about model evaluation in a bit but first…</a:t>
+            </a:r>
+          </a:p>
+          <a:p>
+            <a:pPr marL="0" indent="0">
+              <a:buFont typeface="Arial" panose="020B0604020202020204" pitchFamily="34" charset="0"/>
+              <a:buNone/>
+            </a:pPr>
+            <a:endParaRPr lang="en-US" sz="4000" dirty="0"/>
           </a:p>
         </p:txBody>
       </p:sp>
@@ -4311,6 +6337,82 @@
     <p:extLst>
       <p:ext uri="{BB962C8B-B14F-4D97-AF65-F5344CB8AC3E}">
         <p14:creationId xmlns:p14="http://schemas.microsoft.com/office/powerpoint/2010/main" val="3127966557"/>
+      </p:ext>
+    </p:extLst>
+  </p:cSld>
+  <p:clrMapOvr>
+    <a:masterClrMapping/>
+  </p:clrMapOvr>
+</p:sld>
+</file>
+
+<file path=ppt/slides/slide9.xml><?xml version="1.0" encoding="utf-8"?>
+<p:sld xmlns:a="http://schemas.openxmlformats.org/drawingml/2006/main" xmlns:r="http://schemas.openxmlformats.org/officeDocument/2006/relationships" xmlns:p="http://schemas.openxmlformats.org/presentationml/2006/main">
+  <p:cSld>
+    <p:spTree>
+      <p:nvGrpSpPr>
+        <p:cNvPr id="1" name=""/>
+        <p:cNvGrpSpPr/>
+        <p:nvPr/>
+      </p:nvGrpSpPr>
+      <p:grpSpPr>
+        <a:xfrm>
+          <a:off x="0" y="0"/>
+          <a:ext cx="0" cy="0"/>
+          <a:chOff x="0" y="0"/>
+          <a:chExt cx="0" cy="0"/>
+        </a:xfrm>
+      </p:grpSpPr>
+      <p:sp>
+        <p:nvSpPr>
+          <p:cNvPr id="2" name="Title 1"/>
+          <p:cNvSpPr>
+            <a:spLocks noGrp="1"/>
+          </p:cNvSpPr>
+          <p:nvPr>
+            <p:ph type="title"/>
+          </p:nvPr>
+        </p:nvSpPr>
+        <p:spPr/>
+        <p:txBody>
+          <a:bodyPr/>
+          <a:lstStyle/>
+          <a:p>
+            <a:r>
+              <a:rPr lang="en-US" dirty="0"/>
+              <a:t>DEMO of User Interface</a:t>
+            </a:r>
+          </a:p>
+        </p:txBody>
+      </p:sp>
+      <p:pic>
+        <p:nvPicPr>
+          <p:cNvPr id="4" name="Picture 3"/>
+          <p:cNvPicPr>
+            <a:picLocks noChangeAspect="1"/>
+          </p:cNvPicPr>
+          <p:nvPr/>
+        </p:nvPicPr>
+        <p:blipFill>
+          <a:blip r:embed="rId2"/>
+          <a:stretch>
+            <a:fillRect/>
+          </a:stretch>
+        </p:blipFill>
+        <p:spPr>
+          <a:xfrm>
+            <a:off x="1528816" y="1963270"/>
+            <a:ext cx="9448800" cy="4074867"/>
+          </a:xfrm>
+          <a:prstGeom prst="rect">
+            <a:avLst/>
+          </a:prstGeom>
+        </p:spPr>
+      </p:pic>
+    </p:spTree>
+    <p:extLst>
+      <p:ext uri="{BB962C8B-B14F-4D97-AF65-F5344CB8AC3E}">
+        <p14:creationId xmlns:p14="http://schemas.microsoft.com/office/powerpoint/2010/main" val="1677203956"/>
       </p:ext>
     </p:extLst>
   </p:cSld>

</xml_diff>